<commit_message>
On the way to create data for evaluation
</commit_message>
<xml_diff>
--- a/miscellanous/Presentation1.pptx
+++ b/miscellanous/Presentation1.pptx
@@ -10,6 +10,7 @@
     <p:sldId id="258" r:id="rId4"/>
     <p:sldId id="259" r:id="rId5"/>
     <p:sldId id="260" r:id="rId6"/>
+    <p:sldId id="261" r:id="rId7"/>
   </p:sldIdLst>
   <p:sldSz cx="12192000" cy="6858000"/>
   <p:notesSz cx="6858000" cy="9144000"/>
@@ -108,7 +109,16 @@
       </a:defRPr>
     </a:lvl9pPr>
   </p:defaultTextStyle>
+  <p:extLst>
+    <p:ext uri="{EFAFB233-063F-42B5-8137-9DF3F51BA10A}">
+      <p15:sldGuideLst xmlns:p15="http://schemas.microsoft.com/office/powerpoint/2012/main"/>
+    </p:ext>
+  </p:extLst>
 </p:presentation>
+</file>
+
+<file path=ppt/revisionInfo.xml><?xml version="1.0" encoding="utf-8"?>
+<p1510:revInfo xmlns:a="http://schemas.openxmlformats.org/drawingml/2006/main" xmlns:r="http://schemas.openxmlformats.org/officeDocument/2006/relationships" xmlns:p1510="http://schemas.microsoft.com/office/powerpoint/2015/10/main"/>
 </file>
 
 <file path=ppt/slideLayouts/slideLayout1.xml><?xml version="1.0" encoding="utf-8"?>
@@ -258,7 +268,7 @@
           <a:p>
             <a:fld id="{0B9FB5A3-E293-4A93-A517-004E35C7CEF9}" type="datetimeFigureOut">
               <a:rPr lang="en-US" smtClean="0"/>
-              <a:t>1/21/2018</a:t>
+              <a:t>1/28/2018</a:t>
             </a:fld>
             <a:endParaRPr lang="en-US"/>
           </a:p>
@@ -456,7 +466,7 @@
           <a:p>
             <a:fld id="{0B9FB5A3-E293-4A93-A517-004E35C7CEF9}" type="datetimeFigureOut">
               <a:rPr lang="en-US" smtClean="0"/>
-              <a:t>1/21/2018</a:t>
+              <a:t>1/28/2018</a:t>
             </a:fld>
             <a:endParaRPr lang="en-US"/>
           </a:p>
@@ -664,7 +674,7 @@
           <a:p>
             <a:fld id="{0B9FB5A3-E293-4A93-A517-004E35C7CEF9}" type="datetimeFigureOut">
               <a:rPr lang="en-US" smtClean="0"/>
-              <a:t>1/21/2018</a:t>
+              <a:t>1/28/2018</a:t>
             </a:fld>
             <a:endParaRPr lang="en-US"/>
           </a:p>
@@ -862,7 +872,7 @@
           <a:p>
             <a:fld id="{0B9FB5A3-E293-4A93-A517-004E35C7CEF9}" type="datetimeFigureOut">
               <a:rPr lang="en-US" smtClean="0"/>
-              <a:t>1/21/2018</a:t>
+              <a:t>1/28/2018</a:t>
             </a:fld>
             <a:endParaRPr lang="en-US"/>
           </a:p>
@@ -1137,7 +1147,7 @@
           <a:p>
             <a:fld id="{0B9FB5A3-E293-4A93-A517-004E35C7CEF9}" type="datetimeFigureOut">
               <a:rPr lang="en-US" smtClean="0"/>
-              <a:t>1/21/2018</a:t>
+              <a:t>1/28/2018</a:t>
             </a:fld>
             <a:endParaRPr lang="en-US"/>
           </a:p>
@@ -1402,7 +1412,7 @@
           <a:p>
             <a:fld id="{0B9FB5A3-E293-4A93-A517-004E35C7CEF9}" type="datetimeFigureOut">
               <a:rPr lang="en-US" smtClean="0"/>
-              <a:t>1/21/2018</a:t>
+              <a:t>1/28/2018</a:t>
             </a:fld>
             <a:endParaRPr lang="en-US"/>
           </a:p>
@@ -1814,7 +1824,7 @@
           <a:p>
             <a:fld id="{0B9FB5A3-E293-4A93-A517-004E35C7CEF9}" type="datetimeFigureOut">
               <a:rPr lang="en-US" smtClean="0"/>
-              <a:t>1/21/2018</a:t>
+              <a:t>1/28/2018</a:t>
             </a:fld>
             <a:endParaRPr lang="en-US"/>
           </a:p>
@@ -1955,7 +1965,7 @@
           <a:p>
             <a:fld id="{0B9FB5A3-E293-4A93-A517-004E35C7CEF9}" type="datetimeFigureOut">
               <a:rPr lang="en-US" smtClean="0"/>
-              <a:t>1/21/2018</a:t>
+              <a:t>1/28/2018</a:t>
             </a:fld>
             <a:endParaRPr lang="en-US"/>
           </a:p>
@@ -2068,7 +2078,7 @@
           <a:p>
             <a:fld id="{0B9FB5A3-E293-4A93-A517-004E35C7CEF9}" type="datetimeFigureOut">
               <a:rPr lang="en-US" smtClean="0"/>
-              <a:t>1/21/2018</a:t>
+              <a:t>1/28/2018</a:t>
             </a:fld>
             <a:endParaRPr lang="en-US"/>
           </a:p>
@@ -2379,7 +2389,7 @@
           <a:p>
             <a:fld id="{0B9FB5A3-E293-4A93-A517-004E35C7CEF9}" type="datetimeFigureOut">
               <a:rPr lang="en-US" smtClean="0"/>
-              <a:t>1/21/2018</a:t>
+              <a:t>1/28/2018</a:t>
             </a:fld>
             <a:endParaRPr lang="en-US"/>
           </a:p>
@@ -2667,7 +2677,7 @@
           <a:p>
             <a:fld id="{0B9FB5A3-E293-4A93-A517-004E35C7CEF9}" type="datetimeFigureOut">
               <a:rPr lang="en-US" smtClean="0"/>
-              <a:t>1/21/2018</a:t>
+              <a:t>1/28/2018</a:t>
             </a:fld>
             <a:endParaRPr lang="en-US"/>
           </a:p>
@@ -2908,7 +2918,7 @@
           <a:p>
             <a:fld id="{0B9FB5A3-E293-4A93-A517-004E35C7CEF9}" type="datetimeFigureOut">
               <a:rPr lang="en-US" smtClean="0"/>
-              <a:t>1/21/2018</a:t>
+              <a:t>1/28/2018</a:t>
             </a:fld>
             <a:endParaRPr lang="en-US"/>
           </a:p>
@@ -5559,7 +5569,7 @@
         <p:spPr>
           <a:xfrm>
             <a:off x="2204185" y="5029564"/>
-            <a:ext cx="510139" cy="307777"/>
+            <a:ext cx="510139" cy="369332"/>
           </a:xfrm>
           <a:prstGeom prst="rect">
             <a:avLst/>
@@ -5573,7 +5583,7 @@
           <a:lstStyle/>
           <a:p>
             <a:r>
-              <a:rPr lang="en-US" sz="1400" dirty="0"/>
+              <a:rPr lang="en-US" dirty="0"/>
               <a:t>0.0</a:t>
             </a:r>
           </a:p>
@@ -5593,8 +5603,8 @@
         </p:nvSpPr>
         <p:spPr>
           <a:xfrm>
-            <a:off x="4593658" y="5004029"/>
-            <a:ext cx="510139" cy="307777"/>
+            <a:off x="4549026" y="5004029"/>
+            <a:ext cx="618592" cy="369332"/>
           </a:xfrm>
           <a:prstGeom prst="rect">
             <a:avLst/>
@@ -5608,7 +5618,7 @@
           <a:lstStyle/>
           <a:p>
             <a:r>
-              <a:rPr lang="en-US" sz="1400" dirty="0"/>
+              <a:rPr lang="en-US" dirty="0"/>
               <a:t>0.04</a:t>
             </a:r>
           </a:p>
@@ -5628,8 +5638,8 @@
         </p:nvSpPr>
         <p:spPr>
           <a:xfrm>
-            <a:off x="7228304" y="5004028"/>
-            <a:ext cx="510139" cy="307777"/>
+            <a:off x="7119852" y="5004028"/>
+            <a:ext cx="618592" cy="369332"/>
           </a:xfrm>
           <a:prstGeom prst="rect">
             <a:avLst/>
@@ -5643,7 +5653,7 @@
           <a:lstStyle/>
           <a:p>
             <a:r>
-              <a:rPr lang="en-US" sz="1400" dirty="0"/>
+              <a:rPr lang="en-US" dirty="0"/>
               <a:t>0.53</a:t>
             </a:r>
           </a:p>
@@ -5663,8 +5673,8 @@
         </p:nvSpPr>
         <p:spPr>
           <a:xfrm>
-            <a:off x="9663891" y="5004028"/>
-            <a:ext cx="510139" cy="307777"/>
+            <a:off x="9574691" y="5004028"/>
+            <a:ext cx="599340" cy="369332"/>
           </a:xfrm>
           <a:prstGeom prst="rect">
             <a:avLst/>
@@ -5678,7 +5688,7 @@
           <a:lstStyle/>
           <a:p>
             <a:r>
-              <a:rPr lang="en-US" sz="1400" dirty="0"/>
+              <a:rPr lang="en-US" dirty="0"/>
               <a:t>0.83</a:t>
             </a:r>
           </a:p>
@@ -5688,6 +5698,320 @@
     <p:extLst>
       <p:ext uri="{BB962C8B-B14F-4D97-AF65-F5344CB8AC3E}">
         <p14:creationId xmlns:p14="http://schemas.microsoft.com/office/powerpoint/2010/main" val="1978198614"/>
+      </p:ext>
+    </p:extLst>
+  </p:cSld>
+  <p:clrMapOvr>
+    <a:masterClrMapping/>
+  </p:clrMapOvr>
+</p:sld>
+</file>
+
+<file path=ppt/slides/slide6.xml><?xml version="1.0" encoding="utf-8"?>
+<p:sld xmlns:a="http://schemas.openxmlformats.org/drawingml/2006/main" xmlns:r="http://schemas.openxmlformats.org/officeDocument/2006/relationships" xmlns:p="http://schemas.openxmlformats.org/presentationml/2006/main">
+  <p:cSld>
+    <p:spTree>
+      <p:nvGrpSpPr>
+        <p:cNvPr id="1" name=""/>
+        <p:cNvGrpSpPr/>
+        <p:nvPr/>
+      </p:nvGrpSpPr>
+      <p:grpSpPr>
+        <a:xfrm>
+          <a:off x="0" y="0"/>
+          <a:ext cx="0" cy="0"/>
+          <a:chOff x="0" y="0"/>
+          <a:chExt cx="0" cy="0"/>
+        </a:xfrm>
+      </p:grpSpPr>
+      <p:pic>
+        <p:nvPicPr>
+          <p:cNvPr id="5" name="Picture 4">
+            <a:extLst>
+              <a:ext uri="{FF2B5EF4-FFF2-40B4-BE49-F238E27FC236}">
+                <a16:creationId xmlns:a16="http://schemas.microsoft.com/office/drawing/2014/main" id="{D2C74812-230F-4389-B081-32BF73DD2FE5}"/>
+              </a:ext>
+            </a:extLst>
+          </p:cNvPr>
+          <p:cNvPicPr>
+            <a:picLocks noChangeAspect="1"/>
+          </p:cNvPicPr>
+          <p:nvPr/>
+        </p:nvPicPr>
+        <p:blipFill>
+          <a:blip r:embed="rId2">
+            <a:extLst>
+              <a:ext uri="{28A0092B-C50C-407E-A947-70E740481C1C}">
+                <a14:useLocalDpi xmlns:a14="http://schemas.microsoft.com/office/drawing/2010/main" val="0"/>
+              </a:ext>
+            </a:extLst>
+          </a:blip>
+          <a:stretch>
+            <a:fillRect/>
+          </a:stretch>
+        </p:blipFill>
+        <p:spPr>
+          <a:xfrm>
+            <a:off x="490383" y="2301500"/>
+            <a:ext cx="2249424" cy="2084025"/>
+          </a:xfrm>
+          <a:prstGeom prst="rect">
+            <a:avLst/>
+          </a:prstGeom>
+        </p:spPr>
+      </p:pic>
+      <p:pic>
+        <p:nvPicPr>
+          <p:cNvPr id="7" name="Picture 6">
+            <a:extLst>
+              <a:ext uri="{FF2B5EF4-FFF2-40B4-BE49-F238E27FC236}">
+                <a16:creationId xmlns:a16="http://schemas.microsoft.com/office/drawing/2014/main" id="{0552E286-AE9F-4362-B70E-7EF43EE4C5FA}"/>
+              </a:ext>
+            </a:extLst>
+          </p:cNvPr>
+          <p:cNvPicPr>
+            <a:picLocks noChangeAspect="1"/>
+          </p:cNvPicPr>
+          <p:nvPr/>
+        </p:nvPicPr>
+        <p:blipFill>
+          <a:blip r:embed="rId3">
+            <a:extLst>
+              <a:ext uri="{28A0092B-C50C-407E-A947-70E740481C1C}">
+                <a14:useLocalDpi xmlns:a14="http://schemas.microsoft.com/office/drawing/2010/main" val="0"/>
+              </a:ext>
+            </a:extLst>
+          </a:blip>
+          <a:stretch>
+            <a:fillRect/>
+          </a:stretch>
+        </p:blipFill>
+        <p:spPr>
+          <a:xfrm>
+            <a:off x="2859358" y="2275963"/>
+            <a:ext cx="2281021" cy="2113299"/>
+          </a:xfrm>
+          <a:prstGeom prst="rect">
+            <a:avLst/>
+          </a:prstGeom>
+        </p:spPr>
+      </p:pic>
+      <p:pic>
+        <p:nvPicPr>
+          <p:cNvPr id="9" name="Picture 8">
+            <a:extLst>
+              <a:ext uri="{FF2B5EF4-FFF2-40B4-BE49-F238E27FC236}">
+                <a16:creationId xmlns:a16="http://schemas.microsoft.com/office/drawing/2014/main" id="{3CFFA1DF-4A3E-46D9-99A2-D42561F1ACB5}"/>
+              </a:ext>
+            </a:extLst>
+          </p:cNvPr>
+          <p:cNvPicPr>
+            <a:picLocks noChangeAspect="1"/>
+          </p:cNvPicPr>
+          <p:nvPr/>
+        </p:nvPicPr>
+        <p:blipFill>
+          <a:blip r:embed="rId4">
+            <a:extLst>
+              <a:ext uri="{28A0092B-C50C-407E-A947-70E740481C1C}">
+                <a14:useLocalDpi xmlns:a14="http://schemas.microsoft.com/office/drawing/2010/main" val="0"/>
+              </a:ext>
+            </a:extLst>
+          </a:blip>
+          <a:stretch>
+            <a:fillRect/>
+          </a:stretch>
+        </p:blipFill>
+        <p:spPr>
+          <a:xfrm>
+            <a:off x="5259930" y="2272227"/>
+            <a:ext cx="2281021" cy="2113298"/>
+          </a:xfrm>
+          <a:prstGeom prst="rect">
+            <a:avLst/>
+          </a:prstGeom>
+        </p:spPr>
+      </p:pic>
+      <p:pic>
+        <p:nvPicPr>
+          <p:cNvPr id="11" name="Picture 10">
+            <a:extLst>
+              <a:ext uri="{FF2B5EF4-FFF2-40B4-BE49-F238E27FC236}">
+                <a16:creationId xmlns:a16="http://schemas.microsoft.com/office/drawing/2014/main" id="{99812DA4-D913-4EC8-9936-305684017EE1}"/>
+              </a:ext>
+            </a:extLst>
+          </p:cNvPr>
+          <p:cNvPicPr>
+            <a:picLocks noChangeAspect="1"/>
+          </p:cNvPicPr>
+          <p:nvPr/>
+        </p:nvPicPr>
+        <p:blipFill>
+          <a:blip r:embed="rId5">
+            <a:extLst>
+              <a:ext uri="{28A0092B-C50C-407E-A947-70E740481C1C}">
+                <a14:useLocalDpi xmlns:a14="http://schemas.microsoft.com/office/drawing/2010/main" val="0"/>
+              </a:ext>
+            </a:extLst>
+          </a:blip>
+          <a:stretch>
+            <a:fillRect/>
+          </a:stretch>
+        </p:blipFill>
+        <p:spPr>
+          <a:xfrm>
+            <a:off x="7660502" y="2275963"/>
+            <a:ext cx="2281021" cy="2113299"/>
+          </a:xfrm>
+          <a:prstGeom prst="rect">
+            <a:avLst/>
+          </a:prstGeom>
+        </p:spPr>
+      </p:pic>
+      <p:sp>
+        <p:nvSpPr>
+          <p:cNvPr id="16" name="TextBox 15">
+            <a:extLst>
+              <a:ext uri="{FF2B5EF4-FFF2-40B4-BE49-F238E27FC236}">
+                <a16:creationId xmlns:a16="http://schemas.microsoft.com/office/drawing/2014/main" id="{F12D639D-E579-4137-9434-358042013FA1}"/>
+              </a:ext>
+            </a:extLst>
+          </p:cNvPr>
+          <p:cNvSpPr txBox="1"/>
+          <p:nvPr/>
+        </p:nvSpPr>
+        <p:spPr>
+          <a:xfrm>
+            <a:off x="1298173" y="4411061"/>
+            <a:ext cx="510139" cy="369332"/>
+          </a:xfrm>
+          <a:prstGeom prst="rect">
+            <a:avLst/>
+          </a:prstGeom>
+          <a:noFill/>
+        </p:spPr>
+        <p:txBody>
+          <a:bodyPr wrap="square" rtlCol="0">
+            <a:spAutoFit/>
+          </a:bodyPr>
+          <a:lstStyle/>
+          <a:p>
+            <a:r>
+              <a:rPr lang="en-US" dirty="0"/>
+              <a:t>0.0</a:t>
+            </a:r>
+          </a:p>
+        </p:txBody>
+      </p:sp>
+      <p:sp>
+        <p:nvSpPr>
+          <p:cNvPr id="17" name="TextBox 16">
+            <a:extLst>
+              <a:ext uri="{FF2B5EF4-FFF2-40B4-BE49-F238E27FC236}">
+                <a16:creationId xmlns:a16="http://schemas.microsoft.com/office/drawing/2014/main" id="{1BCD52FD-7D31-4D86-A99D-D56BECD0D950}"/>
+              </a:ext>
+            </a:extLst>
+          </p:cNvPr>
+          <p:cNvSpPr txBox="1"/>
+          <p:nvPr/>
+        </p:nvSpPr>
+        <p:spPr>
+          <a:xfrm>
+            <a:off x="3643014" y="4385526"/>
+            <a:ext cx="618592" cy="369332"/>
+          </a:xfrm>
+          <a:prstGeom prst="rect">
+            <a:avLst/>
+          </a:prstGeom>
+          <a:noFill/>
+        </p:spPr>
+        <p:txBody>
+          <a:bodyPr wrap="square" rtlCol="0">
+            <a:spAutoFit/>
+          </a:bodyPr>
+          <a:lstStyle/>
+          <a:p>
+            <a:r>
+              <a:rPr lang="en-US" dirty="0"/>
+              <a:t>0.69</a:t>
+            </a:r>
+          </a:p>
+        </p:txBody>
+      </p:sp>
+      <p:sp>
+        <p:nvSpPr>
+          <p:cNvPr id="18" name="TextBox 17">
+            <a:extLst>
+              <a:ext uri="{FF2B5EF4-FFF2-40B4-BE49-F238E27FC236}">
+                <a16:creationId xmlns:a16="http://schemas.microsoft.com/office/drawing/2014/main" id="{0A505C15-AE43-4651-B345-52D23E1A59F1}"/>
+              </a:ext>
+            </a:extLst>
+          </p:cNvPr>
+          <p:cNvSpPr txBox="1"/>
+          <p:nvPr/>
+        </p:nvSpPr>
+        <p:spPr>
+          <a:xfrm>
+            <a:off x="6213840" y="4385525"/>
+            <a:ext cx="618592" cy="369332"/>
+          </a:xfrm>
+          <a:prstGeom prst="rect">
+            <a:avLst/>
+          </a:prstGeom>
+          <a:noFill/>
+        </p:spPr>
+        <p:txBody>
+          <a:bodyPr wrap="square" rtlCol="0">
+            <a:spAutoFit/>
+          </a:bodyPr>
+          <a:lstStyle/>
+          <a:p>
+            <a:r>
+              <a:rPr lang="en-US" dirty="0"/>
+              <a:t>0.91</a:t>
+            </a:r>
+          </a:p>
+        </p:txBody>
+      </p:sp>
+      <p:sp>
+        <p:nvSpPr>
+          <p:cNvPr id="19" name="TextBox 18">
+            <a:extLst>
+              <a:ext uri="{FF2B5EF4-FFF2-40B4-BE49-F238E27FC236}">
+                <a16:creationId xmlns:a16="http://schemas.microsoft.com/office/drawing/2014/main" id="{CCFE1AF3-8DF2-4ECD-B4AE-267741D36865}"/>
+              </a:ext>
+            </a:extLst>
+          </p:cNvPr>
+          <p:cNvSpPr txBox="1"/>
+          <p:nvPr/>
+        </p:nvSpPr>
+        <p:spPr>
+          <a:xfrm>
+            <a:off x="8668679" y="4385525"/>
+            <a:ext cx="599340" cy="369332"/>
+          </a:xfrm>
+          <a:prstGeom prst="rect">
+            <a:avLst/>
+          </a:prstGeom>
+          <a:noFill/>
+        </p:spPr>
+        <p:txBody>
+          <a:bodyPr wrap="square" rtlCol="0">
+            <a:spAutoFit/>
+          </a:bodyPr>
+          <a:lstStyle/>
+          <a:p>
+            <a:r>
+              <a:rPr lang="en-US" dirty="0"/>
+              <a:t>0.94</a:t>
+            </a:r>
+          </a:p>
+        </p:txBody>
+      </p:sp>
+    </p:spTree>
+    <p:extLst>
+      <p:ext uri="{BB962C8B-B14F-4D97-AF65-F5344CB8AC3E}">
+        <p14:creationId xmlns:p14="http://schemas.microsoft.com/office/powerpoint/2010/main" val="2744394455"/>
       </p:ext>
     </p:extLst>
   </p:cSld>

</xml_diff>

<commit_message>
Add some miscelanous pictures
</commit_message>
<xml_diff>
--- a/miscellanous/Presentation1.pptx
+++ b/miscellanous/Presentation1.pptx
@@ -117,10 +117,6 @@
 </p:presentation>
 </file>
 
-<file path=ppt/revisionInfo.xml><?xml version="1.0" encoding="utf-8"?>
-<p1510:revInfo xmlns:a="http://schemas.openxmlformats.org/drawingml/2006/main" xmlns:r="http://schemas.openxmlformats.org/officeDocument/2006/relationships" xmlns:p1510="http://schemas.microsoft.com/office/powerpoint/2015/10/main"/>
-</file>
-
 <file path=ppt/slideLayouts/slideLayout1.xml><?xml version="1.0" encoding="utf-8"?>
 <p:sldLayout xmlns:a="http://schemas.openxmlformats.org/drawingml/2006/main" xmlns:r="http://schemas.openxmlformats.org/officeDocument/2006/relationships" xmlns:p="http://schemas.openxmlformats.org/presentationml/2006/main" type="title" preserve="1">
   <p:cSld name="Title Slide">
@@ -268,7 +264,7 @@
           <a:p>
             <a:fld id="{0B9FB5A3-E293-4A93-A517-004E35C7CEF9}" type="datetimeFigureOut">
               <a:rPr lang="en-US" smtClean="0"/>
-              <a:t>1/28/2018</a:t>
+              <a:t>4/29/2018</a:t>
             </a:fld>
             <a:endParaRPr lang="en-US"/>
           </a:p>
@@ -466,7 +462,7 @@
           <a:p>
             <a:fld id="{0B9FB5A3-E293-4A93-A517-004E35C7CEF9}" type="datetimeFigureOut">
               <a:rPr lang="en-US" smtClean="0"/>
-              <a:t>1/28/2018</a:t>
+              <a:t>4/29/2018</a:t>
             </a:fld>
             <a:endParaRPr lang="en-US"/>
           </a:p>
@@ -674,7 +670,7 @@
           <a:p>
             <a:fld id="{0B9FB5A3-E293-4A93-A517-004E35C7CEF9}" type="datetimeFigureOut">
               <a:rPr lang="en-US" smtClean="0"/>
-              <a:t>1/28/2018</a:t>
+              <a:t>4/29/2018</a:t>
             </a:fld>
             <a:endParaRPr lang="en-US"/>
           </a:p>
@@ -872,7 +868,7 @@
           <a:p>
             <a:fld id="{0B9FB5A3-E293-4A93-A517-004E35C7CEF9}" type="datetimeFigureOut">
               <a:rPr lang="en-US" smtClean="0"/>
-              <a:t>1/28/2018</a:t>
+              <a:t>4/29/2018</a:t>
             </a:fld>
             <a:endParaRPr lang="en-US"/>
           </a:p>
@@ -1147,7 +1143,7 @@
           <a:p>
             <a:fld id="{0B9FB5A3-E293-4A93-A517-004E35C7CEF9}" type="datetimeFigureOut">
               <a:rPr lang="en-US" smtClean="0"/>
-              <a:t>1/28/2018</a:t>
+              <a:t>4/29/2018</a:t>
             </a:fld>
             <a:endParaRPr lang="en-US"/>
           </a:p>
@@ -1412,7 +1408,7 @@
           <a:p>
             <a:fld id="{0B9FB5A3-E293-4A93-A517-004E35C7CEF9}" type="datetimeFigureOut">
               <a:rPr lang="en-US" smtClean="0"/>
-              <a:t>1/28/2018</a:t>
+              <a:t>4/29/2018</a:t>
             </a:fld>
             <a:endParaRPr lang="en-US"/>
           </a:p>
@@ -1824,7 +1820,7 @@
           <a:p>
             <a:fld id="{0B9FB5A3-E293-4A93-A517-004E35C7CEF9}" type="datetimeFigureOut">
               <a:rPr lang="en-US" smtClean="0"/>
-              <a:t>1/28/2018</a:t>
+              <a:t>4/29/2018</a:t>
             </a:fld>
             <a:endParaRPr lang="en-US"/>
           </a:p>
@@ -1965,7 +1961,7 @@
           <a:p>
             <a:fld id="{0B9FB5A3-E293-4A93-A517-004E35C7CEF9}" type="datetimeFigureOut">
               <a:rPr lang="en-US" smtClean="0"/>
-              <a:t>1/28/2018</a:t>
+              <a:t>4/29/2018</a:t>
             </a:fld>
             <a:endParaRPr lang="en-US"/>
           </a:p>
@@ -2078,7 +2074,7 @@
           <a:p>
             <a:fld id="{0B9FB5A3-E293-4A93-A517-004E35C7CEF9}" type="datetimeFigureOut">
               <a:rPr lang="en-US" smtClean="0"/>
-              <a:t>1/28/2018</a:t>
+              <a:t>4/29/2018</a:t>
             </a:fld>
             <a:endParaRPr lang="en-US"/>
           </a:p>
@@ -2389,7 +2385,7 @@
           <a:p>
             <a:fld id="{0B9FB5A3-E293-4A93-A517-004E35C7CEF9}" type="datetimeFigureOut">
               <a:rPr lang="en-US" smtClean="0"/>
-              <a:t>1/28/2018</a:t>
+              <a:t>4/29/2018</a:t>
             </a:fld>
             <a:endParaRPr lang="en-US"/>
           </a:p>
@@ -2677,7 +2673,7 @@
           <a:p>
             <a:fld id="{0B9FB5A3-E293-4A93-A517-004E35C7CEF9}" type="datetimeFigureOut">
               <a:rPr lang="en-US" smtClean="0"/>
-              <a:t>1/28/2018</a:t>
+              <a:t>4/29/2018</a:t>
             </a:fld>
             <a:endParaRPr lang="en-US"/>
           </a:p>
@@ -2918,7 +2914,7 @@
           <a:p>
             <a:fld id="{0B9FB5A3-E293-4A93-A517-004E35C7CEF9}" type="datetimeFigureOut">
               <a:rPr lang="en-US" smtClean="0"/>
-              <a:t>1/28/2018</a:t>
+              <a:t>4/29/2018</a:t>
             </a:fld>
             <a:endParaRPr lang="en-US"/>
           </a:p>
@@ -4279,7 +4275,7 @@
         </p:nvSpPr>
         <p:spPr>
           <a:xfrm>
-            <a:off x="5821680" y="2887579"/>
+            <a:off x="2457378" y="2827194"/>
             <a:ext cx="548640" cy="548640"/>
           </a:xfrm>
           <a:prstGeom prst="rect">
@@ -4325,7 +4321,7 @@
         </p:nvSpPr>
         <p:spPr>
           <a:xfrm>
-            <a:off x="5273040" y="2338939"/>
+            <a:off x="1908738" y="2278554"/>
             <a:ext cx="1645920" cy="1645920"/>
           </a:xfrm>
           <a:prstGeom prst="ellipse">
@@ -4372,7 +4368,7 @@
         </p:nvSpPr>
         <p:spPr>
           <a:xfrm>
-            <a:off x="4724400" y="1790299"/>
+            <a:off x="1360098" y="1729914"/>
             <a:ext cx="2743200" cy="2743200"/>
           </a:xfrm>
           <a:prstGeom prst="ellipse">
@@ -4419,7 +4415,7 @@
         </p:nvSpPr>
         <p:spPr>
           <a:xfrm>
-            <a:off x="3901440" y="967339"/>
+            <a:off x="537138" y="906954"/>
             <a:ext cx="4389120" cy="4389120"/>
           </a:xfrm>
           <a:prstGeom prst="ellipse">
@@ -4468,8 +4464,8 @@
         </p:nvCxnSpPr>
         <p:spPr>
           <a:xfrm flipH="1" flipV="1">
-            <a:off x="4985886" y="779646"/>
-            <a:ext cx="2184935" cy="4822258"/>
+            <a:off x="1794294" y="1130060"/>
+            <a:ext cx="1826031" cy="3985405"/>
           </a:xfrm>
           <a:prstGeom prst="line">
             <a:avLst/>
@@ -4506,8 +4502,8 @@
         </p:nvCxnSpPr>
         <p:spPr>
           <a:xfrm flipV="1">
-            <a:off x="3628724" y="2088682"/>
-            <a:ext cx="5043638" cy="2215199"/>
+            <a:off x="750498" y="2309627"/>
+            <a:ext cx="4019910" cy="1729147"/>
           </a:xfrm>
           <a:prstGeom prst="line">
             <a:avLst/>
@@ -4544,8 +4540,8 @@
         </p:nvCxnSpPr>
         <p:spPr>
           <a:xfrm flipV="1">
-            <a:off x="4985886" y="635268"/>
-            <a:ext cx="2184935" cy="5080936"/>
+            <a:off x="1867286" y="1086929"/>
+            <a:ext cx="1736887" cy="4028535"/>
           </a:xfrm>
           <a:prstGeom prst="line">
             <a:avLst/>
@@ -4582,8 +4578,8 @@
         </p:nvCxnSpPr>
         <p:spPr>
           <a:xfrm>
-            <a:off x="3519638" y="2224639"/>
-            <a:ext cx="5152724" cy="2092291"/>
+            <a:off x="655608" y="2366759"/>
+            <a:ext cx="4054415" cy="1704909"/>
           </a:xfrm>
           <a:prstGeom prst="line">
             <a:avLst/>
@@ -4618,8 +4614,8 @@
         </p:nvSpPr>
         <p:spPr>
           <a:xfrm>
-            <a:off x="5967663" y="2454442"/>
-            <a:ext cx="288758" cy="369332"/>
+            <a:off x="2576491" y="2392772"/>
+            <a:ext cx="288758" cy="461665"/>
           </a:xfrm>
           <a:prstGeom prst="rect">
             <a:avLst/>
@@ -4633,18 +4629,18 @@
           <a:lstStyle/>
           <a:p>
             <a:r>
-              <a:rPr lang="en-US" dirty="0"/>
-              <a:t>1</a:t>
-            </a:r>
-          </a:p>
-        </p:txBody>
-      </p:sp>
-      <p:sp>
-        <p:nvSpPr>
-          <p:cNvPr id="29" name="TextBox 28">
-            <a:extLst>
-              <a:ext uri="{FF2B5EF4-FFF2-40B4-BE49-F238E27FC236}">
-                <a16:creationId xmlns:a16="http://schemas.microsoft.com/office/drawing/2014/main" id="{FDAEDFCA-7D44-4CD2-8B6B-573F769D6F34}"/>
+              <a:rPr lang="en-US" sz="2400" dirty="0"/>
+              <a:t>0</a:t>
+            </a:r>
+          </a:p>
+        </p:txBody>
+      </p:sp>
+      <p:sp>
+        <p:nvSpPr>
+          <p:cNvPr id="30" name="TextBox 29">
+            <a:extLst>
+              <a:ext uri="{FF2B5EF4-FFF2-40B4-BE49-F238E27FC236}">
+                <a16:creationId xmlns:a16="http://schemas.microsoft.com/office/drawing/2014/main" id="{76AC0F00-8C87-402B-ACE4-2D46D1B562A2}"/>
               </a:ext>
             </a:extLst>
           </p:cNvPr>
@@ -4653,7 +4649,7 @@
         </p:nvSpPr>
         <p:spPr>
           <a:xfrm>
-            <a:off x="6355450" y="2614081"/>
+            <a:off x="3143165" y="2937686"/>
             <a:ext cx="288758" cy="369332"/>
           </a:xfrm>
           <a:prstGeom prst="rect">
@@ -4669,41 +4665,6 @@
           <a:p>
             <a:r>
               <a:rPr lang="en-US" dirty="0"/>
-              <a:t>2</a:t>
-            </a:r>
-          </a:p>
-        </p:txBody>
-      </p:sp>
-      <p:sp>
-        <p:nvSpPr>
-          <p:cNvPr id="30" name="TextBox 29">
-            <a:extLst>
-              <a:ext uri="{FF2B5EF4-FFF2-40B4-BE49-F238E27FC236}">
-                <a16:creationId xmlns:a16="http://schemas.microsoft.com/office/drawing/2014/main" id="{76AC0F00-8C87-402B-ACE4-2D46D1B562A2}"/>
-              </a:ext>
-            </a:extLst>
-          </p:cNvPr>
-          <p:cNvSpPr txBox="1"/>
-          <p:nvPr/>
-        </p:nvSpPr>
-        <p:spPr>
-          <a:xfrm>
-            <a:off x="6507467" y="2998071"/>
-            <a:ext cx="288758" cy="369332"/>
-          </a:xfrm>
-          <a:prstGeom prst="rect">
-            <a:avLst/>
-          </a:prstGeom>
-          <a:noFill/>
-        </p:spPr>
-        <p:txBody>
-          <a:bodyPr wrap="square" rtlCol="0">
-            <a:spAutoFit/>
-          </a:bodyPr>
-          <a:lstStyle/>
-          <a:p>
-            <a:r>
-              <a:rPr lang="en-US" dirty="0"/>
               <a:t>3</a:t>
             </a:r>
           </a:p>
@@ -4723,7 +4684,7 @@
         </p:nvSpPr>
         <p:spPr>
           <a:xfrm rot="942390">
-            <a:off x="6477802" y="2984235"/>
+            <a:off x="3113500" y="2923850"/>
             <a:ext cx="548640" cy="548640"/>
           </a:xfrm>
           <a:prstGeom prst="rect">
@@ -4772,8 +4733,8 @@
         </p:nvSpPr>
         <p:spPr>
           <a:xfrm>
-            <a:off x="6328203" y="3469378"/>
-            <a:ext cx="288758" cy="369332"/>
+            <a:off x="2984361" y="2488772"/>
+            <a:ext cx="288758" cy="461665"/>
           </a:xfrm>
           <a:prstGeom prst="rect">
             <a:avLst/>
@@ -4787,7 +4748,7 @@
           <a:lstStyle/>
           <a:p>
             <a:r>
-              <a:rPr lang="en-US" dirty="0"/>
+              <a:rPr lang="en-US" sz="2400" dirty="0"/>
               <a:t>4</a:t>
             </a:r>
           </a:p>
@@ -4807,8 +4768,8 @@
         </p:nvSpPr>
         <p:spPr>
           <a:xfrm>
-            <a:off x="5948130" y="3549936"/>
-            <a:ext cx="288758" cy="369332"/>
+            <a:off x="3315415" y="2135925"/>
+            <a:ext cx="288758" cy="461665"/>
           </a:xfrm>
           <a:prstGeom prst="rect">
             <a:avLst/>
@@ -4822,7 +4783,7 @@
           <a:lstStyle/>
           <a:p>
             <a:r>
-              <a:rPr lang="en-US" dirty="0"/>
+              <a:rPr lang="en-US" sz="2400" dirty="0"/>
               <a:t>5</a:t>
             </a:r>
           </a:p>
@@ -4842,8 +4803,8 @@
         </p:nvSpPr>
         <p:spPr>
           <a:xfrm>
-            <a:off x="5535453" y="3411064"/>
-            <a:ext cx="288758" cy="369332"/>
+            <a:off x="3809003" y="1677596"/>
+            <a:ext cx="288758" cy="461665"/>
           </a:xfrm>
           <a:prstGeom prst="rect">
             <a:avLst/>
@@ -4857,7 +4818,7 @@
           <a:lstStyle/>
           <a:p>
             <a:r>
-              <a:rPr lang="en-US" dirty="0"/>
+              <a:rPr lang="en-US" sz="2400" dirty="0"/>
               <a:t>6</a:t>
             </a:r>
           </a:p>
@@ -4865,10 +4826,10 @@
       </p:sp>
       <p:sp>
         <p:nvSpPr>
-          <p:cNvPr id="43" name="TextBox 42">
-            <a:extLst>
-              <a:ext uri="{FF2B5EF4-FFF2-40B4-BE49-F238E27FC236}">
-                <a16:creationId xmlns:a16="http://schemas.microsoft.com/office/drawing/2014/main" id="{84317C7B-31FA-4DC9-986D-907F986013E5}"/>
+          <p:cNvPr id="45" name="TextBox 44">
+            <a:extLst>
+              <a:ext uri="{FF2B5EF4-FFF2-40B4-BE49-F238E27FC236}">
+                <a16:creationId xmlns:a16="http://schemas.microsoft.com/office/drawing/2014/main" id="{872A9B45-D157-46B9-A077-830BAC705189}"/>
               </a:ext>
             </a:extLst>
           </p:cNvPr>
@@ -4877,8 +4838,8 @@
         </p:nvSpPr>
         <p:spPr>
           <a:xfrm>
-            <a:off x="5344231" y="3073889"/>
-            <a:ext cx="288758" cy="369332"/>
+            <a:off x="2587232" y="1860845"/>
+            <a:ext cx="288758" cy="461665"/>
           </a:xfrm>
           <a:prstGeom prst="rect">
             <a:avLst/>
@@ -4892,18 +4853,18 @@
           <a:lstStyle/>
           <a:p>
             <a:r>
-              <a:rPr lang="en-US" dirty="0"/>
-              <a:t>7</a:t>
-            </a:r>
-          </a:p>
-        </p:txBody>
-      </p:sp>
-      <p:sp>
-        <p:nvSpPr>
-          <p:cNvPr id="44" name="TextBox 43">
-            <a:extLst>
-              <a:ext uri="{FF2B5EF4-FFF2-40B4-BE49-F238E27FC236}">
-                <a16:creationId xmlns:a16="http://schemas.microsoft.com/office/drawing/2014/main" id="{AE80798E-AB4F-4232-BB11-864E1570DAA0}"/>
+              <a:rPr lang="en-US" sz="2400" dirty="0"/>
+              <a:t>1</a:t>
+            </a:r>
+          </a:p>
+        </p:txBody>
+      </p:sp>
+      <p:sp>
+        <p:nvSpPr>
+          <p:cNvPr id="50" name="TextBox 49">
+            <a:extLst>
+              <a:ext uri="{FF2B5EF4-FFF2-40B4-BE49-F238E27FC236}">
+                <a16:creationId xmlns:a16="http://schemas.microsoft.com/office/drawing/2014/main" id="{555FE4AE-2C74-4120-BC4C-FB8CE380E787}"/>
               </a:ext>
             </a:extLst>
           </p:cNvPr>
@@ -4912,8 +4873,8 @@
         </p:nvSpPr>
         <p:spPr>
           <a:xfrm>
-            <a:off x="5487189" y="2614081"/>
-            <a:ext cx="288758" cy="369332"/>
+            <a:off x="2587232" y="1215931"/>
+            <a:ext cx="288758" cy="461665"/>
           </a:xfrm>
           <a:prstGeom prst="rect">
             <a:avLst/>
@@ -4927,18 +4888,357 @@
           <a:lstStyle/>
           <a:p>
             <a:r>
-              <a:rPr lang="en-US" dirty="0"/>
-              <a:t>8</a:t>
-            </a:r>
-          </a:p>
-        </p:txBody>
-      </p:sp>
-      <p:sp>
-        <p:nvSpPr>
-          <p:cNvPr id="45" name="TextBox 44">
-            <a:extLst>
-              <a:ext uri="{FF2B5EF4-FFF2-40B4-BE49-F238E27FC236}">
-                <a16:creationId xmlns:a16="http://schemas.microsoft.com/office/drawing/2014/main" id="{872A9B45-D157-46B9-A077-830BAC705189}"/>
+              <a:rPr lang="en-US" sz="2400" dirty="0"/>
+              <a:t>2</a:t>
+            </a:r>
+          </a:p>
+        </p:txBody>
+      </p:sp>
+      <p:sp>
+        <p:nvSpPr>
+          <p:cNvPr id="95" name="Rectangle 94">
+            <a:extLst>
+              <a:ext uri="{FF2B5EF4-FFF2-40B4-BE49-F238E27FC236}">
+                <a16:creationId xmlns:a16="http://schemas.microsoft.com/office/drawing/2014/main" id="{2745BC6A-02ED-46A5-A506-E3F199C3328B}"/>
+              </a:ext>
+            </a:extLst>
+          </p:cNvPr>
+          <p:cNvSpPr/>
+          <p:nvPr/>
+        </p:nvSpPr>
+        <p:spPr>
+          <a:xfrm>
+            <a:off x="8553378" y="2780066"/>
+            <a:ext cx="548640" cy="548640"/>
+          </a:xfrm>
+          <a:prstGeom prst="rect">
+            <a:avLst/>
+          </a:prstGeom>
+        </p:spPr>
+        <p:style>
+          <a:lnRef idx="2">
+            <a:schemeClr val="accent1">
+              <a:shade val="50000"/>
+            </a:schemeClr>
+          </a:lnRef>
+          <a:fillRef idx="1">
+            <a:schemeClr val="accent1"/>
+          </a:fillRef>
+          <a:effectRef idx="0">
+            <a:schemeClr val="accent1"/>
+          </a:effectRef>
+          <a:fontRef idx="minor">
+            <a:schemeClr val="lt1"/>
+          </a:fontRef>
+        </p:style>
+        <p:txBody>
+          <a:bodyPr rtlCol="0" anchor="ctr"/>
+          <a:lstStyle/>
+          <a:p>
+            <a:pPr algn="ctr"/>
+            <a:endParaRPr lang="en-US"/>
+          </a:p>
+        </p:txBody>
+      </p:sp>
+      <p:sp>
+        <p:nvSpPr>
+          <p:cNvPr id="96" name="Oval 95">
+            <a:extLst>
+              <a:ext uri="{FF2B5EF4-FFF2-40B4-BE49-F238E27FC236}">
+                <a16:creationId xmlns:a16="http://schemas.microsoft.com/office/drawing/2014/main" id="{2C6212A3-B1AD-44C7-8CA6-73CAB0893E00}"/>
+              </a:ext>
+            </a:extLst>
+          </p:cNvPr>
+          <p:cNvSpPr/>
+          <p:nvPr/>
+        </p:nvSpPr>
+        <p:spPr>
+          <a:xfrm>
+            <a:off x="8004738" y="2231426"/>
+            <a:ext cx="1645920" cy="1645920"/>
+          </a:xfrm>
+          <a:prstGeom prst="ellipse">
+            <a:avLst/>
+          </a:prstGeom>
+          <a:noFill/>
+        </p:spPr>
+        <p:style>
+          <a:lnRef idx="2">
+            <a:schemeClr val="accent1">
+              <a:shade val="50000"/>
+            </a:schemeClr>
+          </a:lnRef>
+          <a:fillRef idx="1">
+            <a:schemeClr val="accent1"/>
+          </a:fillRef>
+          <a:effectRef idx="0">
+            <a:schemeClr val="accent1"/>
+          </a:effectRef>
+          <a:fontRef idx="minor">
+            <a:schemeClr val="lt1"/>
+          </a:fontRef>
+        </p:style>
+        <p:txBody>
+          <a:bodyPr rtlCol="0" anchor="ctr"/>
+          <a:lstStyle/>
+          <a:p>
+            <a:pPr algn="ctr"/>
+            <a:endParaRPr lang="en-US" dirty="0"/>
+          </a:p>
+        </p:txBody>
+      </p:sp>
+      <p:sp>
+        <p:nvSpPr>
+          <p:cNvPr id="97" name="Oval 96">
+            <a:extLst>
+              <a:ext uri="{FF2B5EF4-FFF2-40B4-BE49-F238E27FC236}">
+                <a16:creationId xmlns:a16="http://schemas.microsoft.com/office/drawing/2014/main" id="{A6F6063C-DBC3-416B-A422-0F57BB879B1D}"/>
+              </a:ext>
+            </a:extLst>
+          </p:cNvPr>
+          <p:cNvSpPr/>
+          <p:nvPr/>
+        </p:nvSpPr>
+        <p:spPr>
+          <a:xfrm>
+            <a:off x="7456098" y="1682786"/>
+            <a:ext cx="2743200" cy="2743200"/>
+          </a:xfrm>
+          <a:prstGeom prst="ellipse">
+            <a:avLst/>
+          </a:prstGeom>
+          <a:noFill/>
+        </p:spPr>
+        <p:style>
+          <a:lnRef idx="2">
+            <a:schemeClr val="accent1">
+              <a:shade val="50000"/>
+            </a:schemeClr>
+          </a:lnRef>
+          <a:fillRef idx="1">
+            <a:schemeClr val="accent1"/>
+          </a:fillRef>
+          <a:effectRef idx="0">
+            <a:schemeClr val="accent1"/>
+          </a:effectRef>
+          <a:fontRef idx="minor">
+            <a:schemeClr val="lt1"/>
+          </a:fontRef>
+        </p:style>
+        <p:txBody>
+          <a:bodyPr rtlCol="0" anchor="ctr"/>
+          <a:lstStyle/>
+          <a:p>
+            <a:pPr algn="ctr"/>
+            <a:endParaRPr lang="en-US"/>
+          </a:p>
+        </p:txBody>
+      </p:sp>
+      <p:sp>
+        <p:nvSpPr>
+          <p:cNvPr id="98" name="Oval 97">
+            <a:extLst>
+              <a:ext uri="{FF2B5EF4-FFF2-40B4-BE49-F238E27FC236}">
+                <a16:creationId xmlns:a16="http://schemas.microsoft.com/office/drawing/2014/main" id="{8CEF861C-667B-40E7-B454-E1F7C36038EB}"/>
+              </a:ext>
+            </a:extLst>
+          </p:cNvPr>
+          <p:cNvSpPr/>
+          <p:nvPr/>
+        </p:nvSpPr>
+        <p:spPr>
+          <a:xfrm>
+            <a:off x="6633138" y="859826"/>
+            <a:ext cx="4389120" cy="4389120"/>
+          </a:xfrm>
+          <a:prstGeom prst="ellipse">
+            <a:avLst/>
+          </a:prstGeom>
+          <a:noFill/>
+        </p:spPr>
+        <p:style>
+          <a:lnRef idx="2">
+            <a:schemeClr val="accent1">
+              <a:shade val="50000"/>
+            </a:schemeClr>
+          </a:lnRef>
+          <a:fillRef idx="1">
+            <a:schemeClr val="accent1"/>
+          </a:fillRef>
+          <a:effectRef idx="0">
+            <a:schemeClr val="accent1"/>
+          </a:effectRef>
+          <a:fontRef idx="minor">
+            <a:schemeClr val="lt1"/>
+          </a:fontRef>
+        </p:style>
+        <p:txBody>
+          <a:bodyPr rtlCol="0" anchor="ctr"/>
+          <a:lstStyle/>
+          <a:p>
+            <a:pPr algn="ctr"/>
+            <a:endParaRPr lang="en-US"/>
+          </a:p>
+        </p:txBody>
+      </p:sp>
+      <p:cxnSp>
+        <p:nvCxnSpPr>
+          <p:cNvPr id="99" name="Straight Connector 98">
+            <a:extLst>
+              <a:ext uri="{FF2B5EF4-FFF2-40B4-BE49-F238E27FC236}">
+                <a16:creationId xmlns:a16="http://schemas.microsoft.com/office/drawing/2014/main" id="{B4C9DE6E-C25D-41C7-A8CC-217B5752091C}"/>
+              </a:ext>
+            </a:extLst>
+          </p:cNvPr>
+          <p:cNvCxnSpPr>
+            <a:cxnSpLocks/>
+          </p:cNvCxnSpPr>
+          <p:nvPr/>
+        </p:nvCxnSpPr>
+        <p:spPr>
+          <a:xfrm flipH="1" flipV="1">
+            <a:off x="7890294" y="1082932"/>
+            <a:ext cx="1826031" cy="3985405"/>
+          </a:xfrm>
+          <a:prstGeom prst="line">
+            <a:avLst/>
+          </a:prstGeom>
+        </p:spPr>
+        <p:style>
+          <a:lnRef idx="1">
+            <a:schemeClr val="accent1"/>
+          </a:lnRef>
+          <a:fillRef idx="0">
+            <a:schemeClr val="accent1"/>
+          </a:fillRef>
+          <a:effectRef idx="0">
+            <a:schemeClr val="accent1"/>
+          </a:effectRef>
+          <a:fontRef idx="minor">
+            <a:schemeClr val="tx1"/>
+          </a:fontRef>
+        </p:style>
+      </p:cxnSp>
+      <p:cxnSp>
+        <p:nvCxnSpPr>
+          <p:cNvPr id="100" name="Straight Connector 99">
+            <a:extLst>
+              <a:ext uri="{FF2B5EF4-FFF2-40B4-BE49-F238E27FC236}">
+                <a16:creationId xmlns:a16="http://schemas.microsoft.com/office/drawing/2014/main" id="{C9A492C9-9691-4FF2-B3D6-59E74BE19EBD}"/>
+              </a:ext>
+            </a:extLst>
+          </p:cNvPr>
+          <p:cNvCxnSpPr>
+            <a:cxnSpLocks/>
+          </p:cNvCxnSpPr>
+          <p:nvPr/>
+        </p:nvCxnSpPr>
+        <p:spPr>
+          <a:xfrm flipV="1">
+            <a:off x="6846498" y="2262499"/>
+            <a:ext cx="4019910" cy="1729147"/>
+          </a:xfrm>
+          <a:prstGeom prst="line">
+            <a:avLst/>
+          </a:prstGeom>
+        </p:spPr>
+        <p:style>
+          <a:lnRef idx="1">
+            <a:schemeClr val="accent1"/>
+          </a:lnRef>
+          <a:fillRef idx="0">
+            <a:schemeClr val="accent1"/>
+          </a:fillRef>
+          <a:effectRef idx="0">
+            <a:schemeClr val="accent1"/>
+          </a:effectRef>
+          <a:fontRef idx="minor">
+            <a:schemeClr val="tx1"/>
+          </a:fontRef>
+        </p:style>
+      </p:cxnSp>
+      <p:cxnSp>
+        <p:nvCxnSpPr>
+          <p:cNvPr id="101" name="Straight Connector 100">
+            <a:extLst>
+              <a:ext uri="{FF2B5EF4-FFF2-40B4-BE49-F238E27FC236}">
+                <a16:creationId xmlns:a16="http://schemas.microsoft.com/office/drawing/2014/main" id="{68C6D1E7-F804-4D27-8113-15969A349F46}"/>
+              </a:ext>
+            </a:extLst>
+          </p:cNvPr>
+          <p:cNvCxnSpPr>
+            <a:cxnSpLocks/>
+          </p:cNvCxnSpPr>
+          <p:nvPr/>
+        </p:nvCxnSpPr>
+        <p:spPr>
+          <a:xfrm flipV="1">
+            <a:off x="7963286" y="1039801"/>
+            <a:ext cx="1736887" cy="4028535"/>
+          </a:xfrm>
+          <a:prstGeom prst="line">
+            <a:avLst/>
+          </a:prstGeom>
+        </p:spPr>
+        <p:style>
+          <a:lnRef idx="1">
+            <a:schemeClr val="accent1"/>
+          </a:lnRef>
+          <a:fillRef idx="0">
+            <a:schemeClr val="accent1"/>
+          </a:fillRef>
+          <a:effectRef idx="0">
+            <a:schemeClr val="accent1"/>
+          </a:effectRef>
+          <a:fontRef idx="minor">
+            <a:schemeClr val="tx1"/>
+          </a:fontRef>
+        </p:style>
+      </p:cxnSp>
+      <p:cxnSp>
+        <p:nvCxnSpPr>
+          <p:cNvPr id="102" name="Straight Connector 101">
+            <a:extLst>
+              <a:ext uri="{FF2B5EF4-FFF2-40B4-BE49-F238E27FC236}">
+                <a16:creationId xmlns:a16="http://schemas.microsoft.com/office/drawing/2014/main" id="{D26D19AF-10F9-41FA-B0F5-B6AD6A233AA1}"/>
+              </a:ext>
+            </a:extLst>
+          </p:cNvPr>
+          <p:cNvCxnSpPr>
+            <a:cxnSpLocks/>
+          </p:cNvCxnSpPr>
+          <p:nvPr/>
+        </p:nvCxnSpPr>
+        <p:spPr>
+          <a:xfrm>
+            <a:off x="6751608" y="2319631"/>
+            <a:ext cx="4054415" cy="1704909"/>
+          </a:xfrm>
+          <a:prstGeom prst="line">
+            <a:avLst/>
+          </a:prstGeom>
+        </p:spPr>
+        <p:style>
+          <a:lnRef idx="1">
+            <a:schemeClr val="accent1"/>
+          </a:lnRef>
+          <a:fillRef idx="0">
+            <a:schemeClr val="accent1"/>
+          </a:fillRef>
+          <a:effectRef idx="0">
+            <a:schemeClr val="accent1"/>
+          </a:effectRef>
+          <a:fontRef idx="minor">
+            <a:schemeClr val="tx1"/>
+          </a:fontRef>
+        </p:style>
+      </p:cxnSp>
+      <p:sp>
+        <p:nvSpPr>
+          <p:cNvPr id="103" name="TextBox 102">
+            <a:extLst>
+              <a:ext uri="{FF2B5EF4-FFF2-40B4-BE49-F238E27FC236}">
+                <a16:creationId xmlns:a16="http://schemas.microsoft.com/office/drawing/2014/main" id="{0CAF30AE-9086-4071-A3E3-F94C951BBDD0}"/>
               </a:ext>
             </a:extLst>
           </p:cNvPr>
@@ -4947,8 +5247,8 @@
         </p:nvSpPr>
         <p:spPr>
           <a:xfrm>
-            <a:off x="5933974" y="1948361"/>
-            <a:ext cx="288758" cy="369332"/>
+            <a:off x="8699361" y="2346929"/>
+            <a:ext cx="288758" cy="461665"/>
           </a:xfrm>
           <a:prstGeom prst="rect">
             <a:avLst/>
@@ -4962,12 +5262,385 @@
           <a:lstStyle/>
           <a:p>
             <a:r>
-              <a:rPr lang="en-US" dirty="0"/>
-              <a:t>9</a:t>
-            </a:r>
-          </a:p>
-        </p:txBody>
-      </p:sp>
+              <a:rPr lang="en-US" sz="2400" dirty="0"/>
+              <a:t>3</a:t>
+            </a:r>
+          </a:p>
+        </p:txBody>
+      </p:sp>
+      <p:sp>
+        <p:nvSpPr>
+          <p:cNvPr id="105" name="Rectangle 104">
+            <a:extLst>
+              <a:ext uri="{FF2B5EF4-FFF2-40B4-BE49-F238E27FC236}">
+                <a16:creationId xmlns:a16="http://schemas.microsoft.com/office/drawing/2014/main" id="{DF50F5BA-6959-49A8-8ACE-D5EEC7448AFE}"/>
+              </a:ext>
+            </a:extLst>
+          </p:cNvPr>
+          <p:cNvSpPr/>
+          <p:nvPr/>
+        </p:nvSpPr>
+        <p:spPr>
+          <a:xfrm>
+            <a:off x="8567729" y="1698323"/>
+            <a:ext cx="548640" cy="548640"/>
+          </a:xfrm>
+          <a:prstGeom prst="rect">
+            <a:avLst/>
+          </a:prstGeom>
+          <a:solidFill>
+            <a:srgbClr val="FF0000"/>
+          </a:solidFill>
+        </p:spPr>
+        <p:style>
+          <a:lnRef idx="2">
+            <a:schemeClr val="accent1">
+              <a:shade val="50000"/>
+            </a:schemeClr>
+          </a:lnRef>
+          <a:fillRef idx="1">
+            <a:schemeClr val="accent1"/>
+          </a:fillRef>
+          <a:effectRef idx="0">
+            <a:schemeClr val="accent1"/>
+          </a:effectRef>
+          <a:fontRef idx="minor">
+            <a:schemeClr val="lt1"/>
+          </a:fontRef>
+        </p:style>
+        <p:txBody>
+          <a:bodyPr rtlCol="0" anchor="ctr"/>
+          <a:lstStyle/>
+          <a:p>
+            <a:pPr algn="ctr"/>
+            <a:endParaRPr lang="en-US"/>
+          </a:p>
+        </p:txBody>
+      </p:sp>
+      <p:sp>
+        <p:nvSpPr>
+          <p:cNvPr id="106" name="TextBox 105">
+            <a:extLst>
+              <a:ext uri="{FF2B5EF4-FFF2-40B4-BE49-F238E27FC236}">
+                <a16:creationId xmlns:a16="http://schemas.microsoft.com/office/drawing/2014/main" id="{BFFE6D16-212C-45DA-AE0D-5728F53F177D}"/>
+              </a:ext>
+            </a:extLst>
+          </p:cNvPr>
+          <p:cNvSpPr txBox="1"/>
+          <p:nvPr/>
+        </p:nvSpPr>
+        <p:spPr>
+          <a:xfrm>
+            <a:off x="7828246" y="2056268"/>
+            <a:ext cx="288758" cy="461665"/>
+          </a:xfrm>
+          <a:prstGeom prst="rect">
+            <a:avLst/>
+          </a:prstGeom>
+          <a:noFill/>
+        </p:spPr>
+        <p:txBody>
+          <a:bodyPr wrap="square" rtlCol="0">
+            <a:spAutoFit/>
+          </a:bodyPr>
+          <a:lstStyle/>
+          <a:p>
+            <a:r>
+              <a:rPr lang="en-US" sz="2400" dirty="0"/>
+              <a:t>4</a:t>
+            </a:r>
+          </a:p>
+        </p:txBody>
+      </p:sp>
+      <p:sp>
+        <p:nvSpPr>
+          <p:cNvPr id="107" name="TextBox 106">
+            <a:extLst>
+              <a:ext uri="{FF2B5EF4-FFF2-40B4-BE49-F238E27FC236}">
+                <a16:creationId xmlns:a16="http://schemas.microsoft.com/office/drawing/2014/main" id="{D13468DE-1364-450E-81C6-D0547B96F68B}"/>
+              </a:ext>
+            </a:extLst>
+          </p:cNvPr>
+          <p:cNvSpPr txBox="1"/>
+          <p:nvPr/>
+        </p:nvSpPr>
+        <p:spPr>
+          <a:xfrm>
+            <a:off x="9541110" y="2026475"/>
+            <a:ext cx="288758" cy="461665"/>
+          </a:xfrm>
+          <a:prstGeom prst="rect">
+            <a:avLst/>
+          </a:prstGeom>
+          <a:noFill/>
+        </p:spPr>
+        <p:txBody>
+          <a:bodyPr wrap="square" rtlCol="0">
+            <a:spAutoFit/>
+          </a:bodyPr>
+          <a:lstStyle/>
+          <a:p>
+            <a:r>
+              <a:rPr lang="en-US" sz="2400" dirty="0"/>
+              <a:t>2</a:t>
+            </a:r>
+          </a:p>
+        </p:txBody>
+      </p:sp>
+      <p:sp>
+        <p:nvSpPr>
+          <p:cNvPr id="109" name="TextBox 108">
+            <a:extLst>
+              <a:ext uri="{FF2B5EF4-FFF2-40B4-BE49-F238E27FC236}">
+                <a16:creationId xmlns:a16="http://schemas.microsoft.com/office/drawing/2014/main" id="{0A8D9D63-0F59-48C8-85C8-C318513F297C}"/>
+              </a:ext>
+            </a:extLst>
+          </p:cNvPr>
+          <p:cNvSpPr txBox="1"/>
+          <p:nvPr/>
+        </p:nvSpPr>
+        <p:spPr>
+          <a:xfrm>
+            <a:off x="8677115" y="1711891"/>
+            <a:ext cx="288758" cy="461665"/>
+          </a:xfrm>
+          <a:prstGeom prst="rect">
+            <a:avLst/>
+          </a:prstGeom>
+          <a:noFill/>
+        </p:spPr>
+        <p:txBody>
+          <a:bodyPr wrap="square" rtlCol="0">
+            <a:spAutoFit/>
+          </a:bodyPr>
+          <a:lstStyle/>
+          <a:p>
+            <a:r>
+              <a:rPr lang="en-US" sz="2400" dirty="0"/>
+              <a:t>0</a:t>
+            </a:r>
+          </a:p>
+        </p:txBody>
+      </p:sp>
+      <p:sp>
+        <p:nvSpPr>
+          <p:cNvPr id="110" name="TextBox 109">
+            <a:extLst>
+              <a:ext uri="{FF2B5EF4-FFF2-40B4-BE49-F238E27FC236}">
+                <a16:creationId xmlns:a16="http://schemas.microsoft.com/office/drawing/2014/main" id="{9B863F1D-694F-43B4-BB00-3355ED8AC6B7}"/>
+              </a:ext>
+            </a:extLst>
+          </p:cNvPr>
+          <p:cNvSpPr txBox="1"/>
+          <p:nvPr/>
+        </p:nvSpPr>
+        <p:spPr>
+          <a:xfrm>
+            <a:off x="8664855" y="1072726"/>
+            <a:ext cx="288758" cy="461665"/>
+          </a:xfrm>
+          <a:prstGeom prst="rect">
+            <a:avLst/>
+          </a:prstGeom>
+          <a:noFill/>
+        </p:spPr>
+        <p:txBody>
+          <a:bodyPr wrap="square" rtlCol="0">
+            <a:spAutoFit/>
+          </a:bodyPr>
+          <a:lstStyle/>
+          <a:p>
+            <a:r>
+              <a:rPr lang="en-US" sz="2400" dirty="0"/>
+              <a:t>1</a:t>
+            </a:r>
+          </a:p>
+        </p:txBody>
+      </p:sp>
+      <p:sp>
+        <p:nvSpPr>
+          <p:cNvPr id="122" name="Arc 121">
+            <a:extLst>
+              <a:ext uri="{FF2B5EF4-FFF2-40B4-BE49-F238E27FC236}">
+                <a16:creationId xmlns:a16="http://schemas.microsoft.com/office/drawing/2014/main" id="{767AB92B-A990-4301-B797-337ED9172B41}"/>
+              </a:ext>
+            </a:extLst>
+          </p:cNvPr>
+          <p:cNvSpPr/>
+          <p:nvPr/>
+        </p:nvSpPr>
+        <p:spPr>
+          <a:xfrm rot="15597998">
+            <a:off x="7973893" y="1858918"/>
+            <a:ext cx="1450937" cy="1645921"/>
+          </a:xfrm>
+          <a:prstGeom prst="arc">
+            <a:avLst>
+              <a:gd name="adj1" fmla="val 18932726"/>
+              <a:gd name="adj2" fmla="val 0"/>
+            </a:avLst>
+          </a:prstGeom>
+          <a:ln w="28575">
+            <a:headEnd type="arrow" w="med" len="med"/>
+            <a:tailEnd type="none" w="med" len="med"/>
+          </a:ln>
+        </p:spPr>
+        <p:style>
+          <a:lnRef idx="1">
+            <a:schemeClr val="accent1"/>
+          </a:lnRef>
+          <a:fillRef idx="0">
+            <a:schemeClr val="accent1"/>
+          </a:fillRef>
+          <a:effectRef idx="0">
+            <a:schemeClr val="accent1"/>
+          </a:effectRef>
+          <a:fontRef idx="minor">
+            <a:schemeClr val="tx1"/>
+          </a:fontRef>
+        </p:style>
+        <p:txBody>
+          <a:bodyPr rtlCol="0" anchor="ctr"/>
+          <a:lstStyle/>
+          <a:p>
+            <a:pPr algn="ctr"/>
+            <a:endParaRPr lang="en-US"/>
+          </a:p>
+        </p:txBody>
+      </p:sp>
+      <p:sp>
+        <p:nvSpPr>
+          <p:cNvPr id="123" name="Arc 122">
+            <a:extLst>
+              <a:ext uri="{FF2B5EF4-FFF2-40B4-BE49-F238E27FC236}">
+                <a16:creationId xmlns:a16="http://schemas.microsoft.com/office/drawing/2014/main" id="{37B4B474-F30E-4E5A-A72E-FF3EDBE2901A}"/>
+              </a:ext>
+            </a:extLst>
+          </p:cNvPr>
+          <p:cNvSpPr/>
+          <p:nvPr/>
+        </p:nvSpPr>
+        <p:spPr>
+          <a:xfrm rot="19105020">
+            <a:off x="8328647" y="1924693"/>
+            <a:ext cx="1480883" cy="1589824"/>
+          </a:xfrm>
+          <a:prstGeom prst="arc">
+            <a:avLst>
+              <a:gd name="adj1" fmla="val 18932726"/>
+              <a:gd name="adj2" fmla="val 0"/>
+            </a:avLst>
+          </a:prstGeom>
+          <a:ln w="28575">
+            <a:headEnd type="none" w="med" len="med"/>
+            <a:tailEnd type="arrow" w="med" len="med"/>
+          </a:ln>
+        </p:spPr>
+        <p:style>
+          <a:lnRef idx="1">
+            <a:schemeClr val="accent1"/>
+          </a:lnRef>
+          <a:fillRef idx="0">
+            <a:schemeClr val="accent1"/>
+          </a:fillRef>
+          <a:effectRef idx="0">
+            <a:schemeClr val="accent1"/>
+          </a:effectRef>
+          <a:fontRef idx="minor">
+            <a:schemeClr val="tx1"/>
+          </a:fontRef>
+        </p:style>
+        <p:txBody>
+          <a:bodyPr rtlCol="0" anchor="ctr"/>
+          <a:lstStyle/>
+          <a:p>
+            <a:pPr algn="ctr"/>
+            <a:endParaRPr lang="en-US"/>
+          </a:p>
+        </p:txBody>
+      </p:sp>
+      <p:cxnSp>
+        <p:nvCxnSpPr>
+          <p:cNvPr id="125" name="Straight Arrow Connector 124">
+            <a:extLst>
+              <a:ext uri="{FF2B5EF4-FFF2-40B4-BE49-F238E27FC236}">
+                <a16:creationId xmlns:a16="http://schemas.microsoft.com/office/drawing/2014/main" id="{C4BAA6CB-3D04-490C-ADA8-09C8CFA0BB7E}"/>
+              </a:ext>
+            </a:extLst>
+          </p:cNvPr>
+          <p:cNvCxnSpPr>
+            <a:cxnSpLocks/>
+          </p:cNvCxnSpPr>
+          <p:nvPr/>
+        </p:nvCxnSpPr>
+        <p:spPr>
+          <a:xfrm>
+            <a:off x="8844951" y="2232090"/>
+            <a:ext cx="5751" cy="166717"/>
+          </a:xfrm>
+          <a:prstGeom prst="straightConnector1">
+            <a:avLst/>
+          </a:prstGeom>
+          <a:ln w="28575">
+            <a:tailEnd type="triangle"/>
+          </a:ln>
+        </p:spPr>
+        <p:style>
+          <a:lnRef idx="1">
+            <a:schemeClr val="accent1"/>
+          </a:lnRef>
+          <a:fillRef idx="0">
+            <a:schemeClr val="accent1"/>
+          </a:fillRef>
+          <a:effectRef idx="0">
+            <a:schemeClr val="accent1"/>
+          </a:effectRef>
+          <a:fontRef idx="minor">
+            <a:schemeClr val="tx1"/>
+          </a:fontRef>
+        </p:style>
+      </p:cxnSp>
+      <p:cxnSp>
+        <p:nvCxnSpPr>
+          <p:cNvPr id="128" name="Straight Arrow Connector 127">
+            <a:extLst>
+              <a:ext uri="{FF2B5EF4-FFF2-40B4-BE49-F238E27FC236}">
+                <a16:creationId xmlns:a16="http://schemas.microsoft.com/office/drawing/2014/main" id="{497A5D56-B401-49D0-86E6-A621B9873FCD}"/>
+              </a:ext>
+            </a:extLst>
+          </p:cNvPr>
+          <p:cNvCxnSpPr>
+            <a:cxnSpLocks/>
+          </p:cNvCxnSpPr>
+          <p:nvPr/>
+        </p:nvCxnSpPr>
+        <p:spPr>
+          <a:xfrm flipH="1" flipV="1">
+            <a:off x="8833449" y="1431985"/>
+            <a:ext cx="5698" cy="267265"/>
+          </a:xfrm>
+          <a:prstGeom prst="straightConnector1">
+            <a:avLst/>
+          </a:prstGeom>
+          <a:ln w="28575">
+            <a:tailEnd type="triangle"/>
+          </a:ln>
+        </p:spPr>
+        <p:style>
+          <a:lnRef idx="1">
+            <a:schemeClr val="accent1"/>
+          </a:lnRef>
+          <a:fillRef idx="0">
+            <a:schemeClr val="accent1"/>
+          </a:fillRef>
+          <a:effectRef idx="0">
+            <a:schemeClr val="accent1"/>
+          </a:effectRef>
+          <a:fontRef idx="minor">
+            <a:schemeClr val="tx1"/>
+          </a:fontRef>
+        </p:style>
+      </p:cxnSp>
     </p:spTree>
     <p:extLst>
       <p:ext uri="{BB962C8B-B14F-4D97-AF65-F5344CB8AC3E}">

</xml_diff>

<commit_message>
Fix an important bug in discrete action learner: Previous action is incorrectly calculated
</commit_message>
<xml_diff>
--- a/miscellanous/Presentation1.pptx
+++ b/miscellanous/Presentation1.pptx
@@ -264,7 +264,7 @@
           <a:p>
             <a:fld id="{0B9FB5A3-E293-4A93-A517-004E35C7CEF9}" type="datetimeFigureOut">
               <a:rPr lang="en-US" smtClean="0"/>
-              <a:t>4/29/2018</a:t>
+              <a:t>4/30/2018</a:t>
             </a:fld>
             <a:endParaRPr lang="en-US"/>
           </a:p>
@@ -462,7 +462,7 @@
           <a:p>
             <a:fld id="{0B9FB5A3-E293-4A93-A517-004E35C7CEF9}" type="datetimeFigureOut">
               <a:rPr lang="en-US" smtClean="0"/>
-              <a:t>4/29/2018</a:t>
+              <a:t>4/30/2018</a:t>
             </a:fld>
             <a:endParaRPr lang="en-US"/>
           </a:p>
@@ -670,7 +670,7 @@
           <a:p>
             <a:fld id="{0B9FB5A3-E293-4A93-A517-004E35C7CEF9}" type="datetimeFigureOut">
               <a:rPr lang="en-US" smtClean="0"/>
-              <a:t>4/29/2018</a:t>
+              <a:t>4/30/2018</a:t>
             </a:fld>
             <a:endParaRPr lang="en-US"/>
           </a:p>
@@ -868,7 +868,7 @@
           <a:p>
             <a:fld id="{0B9FB5A3-E293-4A93-A517-004E35C7CEF9}" type="datetimeFigureOut">
               <a:rPr lang="en-US" smtClean="0"/>
-              <a:t>4/29/2018</a:t>
+              <a:t>4/30/2018</a:t>
             </a:fld>
             <a:endParaRPr lang="en-US"/>
           </a:p>
@@ -1143,7 +1143,7 @@
           <a:p>
             <a:fld id="{0B9FB5A3-E293-4A93-A517-004E35C7CEF9}" type="datetimeFigureOut">
               <a:rPr lang="en-US" smtClean="0"/>
-              <a:t>4/29/2018</a:t>
+              <a:t>4/30/2018</a:t>
             </a:fld>
             <a:endParaRPr lang="en-US"/>
           </a:p>
@@ -1408,7 +1408,7 @@
           <a:p>
             <a:fld id="{0B9FB5A3-E293-4A93-A517-004E35C7CEF9}" type="datetimeFigureOut">
               <a:rPr lang="en-US" smtClean="0"/>
-              <a:t>4/29/2018</a:t>
+              <a:t>4/30/2018</a:t>
             </a:fld>
             <a:endParaRPr lang="en-US"/>
           </a:p>
@@ -1820,7 +1820,7 @@
           <a:p>
             <a:fld id="{0B9FB5A3-E293-4A93-A517-004E35C7CEF9}" type="datetimeFigureOut">
               <a:rPr lang="en-US" smtClean="0"/>
-              <a:t>4/29/2018</a:t>
+              <a:t>4/30/2018</a:t>
             </a:fld>
             <a:endParaRPr lang="en-US"/>
           </a:p>
@@ -1961,7 +1961,7 @@
           <a:p>
             <a:fld id="{0B9FB5A3-E293-4A93-A517-004E35C7CEF9}" type="datetimeFigureOut">
               <a:rPr lang="en-US" smtClean="0"/>
-              <a:t>4/29/2018</a:t>
+              <a:t>4/30/2018</a:t>
             </a:fld>
             <a:endParaRPr lang="en-US"/>
           </a:p>
@@ -2074,7 +2074,7 @@
           <a:p>
             <a:fld id="{0B9FB5A3-E293-4A93-A517-004E35C7CEF9}" type="datetimeFigureOut">
               <a:rPr lang="en-US" smtClean="0"/>
-              <a:t>4/29/2018</a:t>
+              <a:t>4/30/2018</a:t>
             </a:fld>
             <a:endParaRPr lang="en-US"/>
           </a:p>
@@ -2385,7 +2385,7 @@
           <a:p>
             <a:fld id="{0B9FB5A3-E293-4A93-A517-004E35C7CEF9}" type="datetimeFigureOut">
               <a:rPr lang="en-US" smtClean="0"/>
-              <a:t>4/29/2018</a:t>
+              <a:t>4/30/2018</a:t>
             </a:fld>
             <a:endParaRPr lang="en-US"/>
           </a:p>
@@ -2673,7 +2673,7 @@
           <a:p>
             <a:fld id="{0B9FB5A3-E293-4A93-A517-004E35C7CEF9}" type="datetimeFigureOut">
               <a:rPr lang="en-US" smtClean="0"/>
-              <a:t>4/29/2018</a:t>
+              <a:t>4/30/2018</a:t>
             </a:fld>
             <a:endParaRPr lang="en-US"/>
           </a:p>
@@ -2914,7 +2914,7 @@
           <a:p>
             <a:fld id="{0B9FB5A3-E293-4A93-A517-004E35C7CEF9}" type="datetimeFigureOut">
               <a:rPr lang="en-US" smtClean="0"/>
-              <a:t>4/29/2018</a:t>
+              <a:t>4/30/2018</a:t>
             </a:fld>
             <a:endParaRPr lang="en-US"/>
           </a:p>
@@ -4303,7 +4303,9 @@
           <a:lstStyle/>
           <a:p>
             <a:pPr algn="ctr"/>
-            <a:endParaRPr lang="en-US"/>
+            <a:endParaRPr lang="en-US">
+              <a:latin typeface="LM Roman 12" panose="00000500000000000000" pitchFamily="50" charset="0"/>
+            </a:endParaRPr>
           </a:p>
         </p:txBody>
       </p:sp>
@@ -4350,7 +4352,9 @@
           <a:lstStyle/>
           <a:p>
             <a:pPr algn="ctr"/>
-            <a:endParaRPr lang="en-US" dirty="0"/>
+            <a:endParaRPr lang="en-US" dirty="0">
+              <a:latin typeface="LM Roman 12" panose="00000500000000000000" pitchFamily="50" charset="0"/>
+            </a:endParaRPr>
           </a:p>
         </p:txBody>
       </p:sp>
@@ -4397,7 +4401,9 @@
           <a:lstStyle/>
           <a:p>
             <a:pPr algn="ctr"/>
-            <a:endParaRPr lang="en-US"/>
+            <a:endParaRPr lang="en-US">
+              <a:latin typeface="LM Roman 12" panose="00000500000000000000" pitchFamily="50" charset="0"/>
+            </a:endParaRPr>
           </a:p>
         </p:txBody>
       </p:sp>
@@ -4444,7 +4450,9 @@
           <a:lstStyle/>
           <a:p>
             <a:pPr algn="ctr"/>
-            <a:endParaRPr lang="en-US"/>
+            <a:endParaRPr lang="en-US">
+              <a:latin typeface="LM Roman 12" panose="00000500000000000000" pitchFamily="50" charset="0"/>
+            </a:endParaRPr>
           </a:p>
         </p:txBody>
       </p:sp>
@@ -4614,7 +4622,7 @@
         </p:nvSpPr>
         <p:spPr>
           <a:xfrm>
-            <a:off x="2576491" y="2392772"/>
+            <a:off x="2564311" y="2366757"/>
             <a:ext cx="288758" cy="461665"/>
           </a:xfrm>
           <a:prstGeom prst="rect">
@@ -4629,7 +4637,9 @@
           <a:lstStyle/>
           <a:p>
             <a:r>
-              <a:rPr lang="en-US" sz="2400" dirty="0"/>
+              <a:rPr lang="en-US" sz="2400" dirty="0">
+                <a:latin typeface="LM Roman 12" panose="00000500000000000000" pitchFamily="50" charset="0"/>
+              </a:rPr>
               <a:t>0</a:t>
             </a:r>
           </a:p>
@@ -4664,7 +4674,9 @@
           <a:lstStyle/>
           <a:p>
             <a:r>
-              <a:rPr lang="en-US" dirty="0"/>
+              <a:rPr lang="en-US" dirty="0">
+                <a:latin typeface="LM Roman 12" panose="00000500000000000000" pitchFamily="50" charset="0"/>
+              </a:rPr>
               <a:t>3</a:t>
             </a:r>
           </a:p>
@@ -4715,7 +4727,9 @@
           <a:lstStyle/>
           <a:p>
             <a:pPr algn="ctr"/>
-            <a:endParaRPr lang="en-US"/>
+            <a:endParaRPr lang="en-US">
+              <a:latin typeface="LM Roman 12" panose="00000500000000000000" pitchFamily="50" charset="0"/>
+            </a:endParaRPr>
           </a:p>
         </p:txBody>
       </p:sp>
@@ -4748,7 +4762,9 @@
           <a:lstStyle/>
           <a:p>
             <a:r>
-              <a:rPr lang="en-US" sz="2400" dirty="0"/>
+              <a:rPr lang="en-US" sz="2400" dirty="0">
+                <a:latin typeface="LM Roman 12" panose="00000500000000000000" pitchFamily="50" charset="0"/>
+              </a:rPr>
               <a:t>4</a:t>
             </a:r>
           </a:p>
@@ -4783,7 +4799,9 @@
           <a:lstStyle/>
           <a:p>
             <a:r>
-              <a:rPr lang="en-US" sz="2400" dirty="0"/>
+              <a:rPr lang="en-US" sz="2400" dirty="0">
+                <a:latin typeface="LM Roman 12" panose="00000500000000000000" pitchFamily="50" charset="0"/>
+              </a:rPr>
               <a:t>5</a:t>
             </a:r>
           </a:p>
@@ -4818,7 +4836,9 @@
           <a:lstStyle/>
           <a:p>
             <a:r>
-              <a:rPr lang="en-US" sz="2400" dirty="0"/>
+              <a:rPr lang="en-US" sz="2400" dirty="0">
+                <a:latin typeface="LM Roman 12" panose="00000500000000000000" pitchFamily="50" charset="0"/>
+              </a:rPr>
               <a:t>6</a:t>
             </a:r>
           </a:p>
@@ -4853,7 +4873,9 @@
           <a:lstStyle/>
           <a:p>
             <a:r>
-              <a:rPr lang="en-US" sz="2400" dirty="0"/>
+              <a:rPr lang="en-US" sz="2400" dirty="0">
+                <a:latin typeface="LM Roman 12" panose="00000500000000000000" pitchFamily="50" charset="0"/>
+              </a:rPr>
               <a:t>1</a:t>
             </a:r>
           </a:p>
@@ -4888,7 +4910,9 @@
           <a:lstStyle/>
           <a:p>
             <a:r>
-              <a:rPr lang="en-US" sz="2400" dirty="0"/>
+              <a:rPr lang="en-US" sz="2400" dirty="0">
+                <a:latin typeface="LM Roman 12" panose="00000500000000000000" pitchFamily="50" charset="0"/>
+              </a:rPr>
               <a:t>2</a:t>
             </a:r>
           </a:p>
@@ -4936,7 +4960,9 @@
           <a:lstStyle/>
           <a:p>
             <a:pPr algn="ctr"/>
-            <a:endParaRPr lang="en-US"/>
+            <a:endParaRPr lang="en-US">
+              <a:latin typeface="LM Roman 12" panose="00000500000000000000" pitchFamily="50" charset="0"/>
+            </a:endParaRPr>
           </a:p>
         </p:txBody>
       </p:sp>
@@ -4983,7 +5009,9 @@
           <a:lstStyle/>
           <a:p>
             <a:pPr algn="ctr"/>
-            <a:endParaRPr lang="en-US" dirty="0"/>
+            <a:endParaRPr lang="en-US" dirty="0">
+              <a:latin typeface="LM Roman 12" panose="00000500000000000000" pitchFamily="50" charset="0"/>
+            </a:endParaRPr>
           </a:p>
         </p:txBody>
       </p:sp>
@@ -5030,7 +5058,9 @@
           <a:lstStyle/>
           <a:p>
             <a:pPr algn="ctr"/>
-            <a:endParaRPr lang="en-US"/>
+            <a:endParaRPr lang="en-US">
+              <a:latin typeface="LM Roman 12" panose="00000500000000000000" pitchFamily="50" charset="0"/>
+            </a:endParaRPr>
           </a:p>
         </p:txBody>
       </p:sp>
@@ -5077,7 +5107,9 @@
           <a:lstStyle/>
           <a:p>
             <a:pPr algn="ctr"/>
-            <a:endParaRPr lang="en-US"/>
+            <a:endParaRPr lang="en-US">
+              <a:latin typeface="LM Roman 12" panose="00000500000000000000" pitchFamily="50" charset="0"/>
+            </a:endParaRPr>
           </a:p>
         </p:txBody>
       </p:sp>
@@ -5262,7 +5294,9 @@
           <a:lstStyle/>
           <a:p>
             <a:r>
-              <a:rPr lang="en-US" sz="2400" dirty="0"/>
+              <a:rPr lang="en-US" sz="2400" dirty="0">
+                <a:latin typeface="LM Roman 12" panose="00000500000000000000" pitchFamily="50" charset="0"/>
+              </a:rPr>
               <a:t>3</a:t>
             </a:r>
           </a:p>
@@ -5313,7 +5347,9 @@
           <a:lstStyle/>
           <a:p>
             <a:pPr algn="ctr"/>
-            <a:endParaRPr lang="en-US"/>
+            <a:endParaRPr lang="en-US">
+              <a:latin typeface="LM Roman 12" panose="00000500000000000000" pitchFamily="50" charset="0"/>
+            </a:endParaRPr>
           </a:p>
         </p:txBody>
       </p:sp>
@@ -5346,7 +5382,9 @@
           <a:lstStyle/>
           <a:p>
             <a:r>
-              <a:rPr lang="en-US" sz="2400" dirty="0"/>
+              <a:rPr lang="en-US" sz="2400" dirty="0">
+                <a:latin typeface="LM Roman 12" panose="00000500000000000000" pitchFamily="50" charset="0"/>
+              </a:rPr>
               <a:t>4</a:t>
             </a:r>
           </a:p>
@@ -5381,7 +5419,9 @@
           <a:lstStyle/>
           <a:p>
             <a:r>
-              <a:rPr lang="en-US" sz="2400" dirty="0"/>
+              <a:rPr lang="en-US" sz="2400" dirty="0">
+                <a:latin typeface="LM Roman 12" panose="00000500000000000000" pitchFamily="50" charset="0"/>
+              </a:rPr>
               <a:t>2</a:t>
             </a:r>
           </a:p>
@@ -5416,7 +5456,9 @@
           <a:lstStyle/>
           <a:p>
             <a:r>
-              <a:rPr lang="en-US" sz="2400" dirty="0"/>
+              <a:rPr lang="en-US" sz="2400" dirty="0">
+                <a:latin typeface="LM Roman 12" panose="00000500000000000000" pitchFamily="50" charset="0"/>
+              </a:rPr>
               <a:t>0</a:t>
             </a:r>
           </a:p>
@@ -5451,7 +5493,9 @@
           <a:lstStyle/>
           <a:p>
             <a:r>
-              <a:rPr lang="en-US" sz="2400" dirty="0"/>
+              <a:rPr lang="en-US" sz="2400" dirty="0">
+                <a:latin typeface="LM Roman 12" panose="00000500000000000000" pitchFamily="50" charset="0"/>
+              </a:rPr>
               <a:t>1</a:t>
             </a:r>
           </a:p>
@@ -5504,7 +5548,9 @@
           <a:lstStyle/>
           <a:p>
             <a:pPr algn="ctr"/>
-            <a:endParaRPr lang="en-US"/>
+            <a:endParaRPr lang="en-US">
+              <a:latin typeface="LM Roman 12" panose="00000500000000000000" pitchFamily="50" charset="0"/>
+            </a:endParaRPr>
           </a:p>
         </p:txBody>
       </p:sp>
@@ -5555,7 +5601,9 @@
           <a:lstStyle/>
           <a:p>
             <a:pPr algn="ctr"/>
-            <a:endParaRPr lang="en-US"/>
+            <a:endParaRPr lang="en-US">
+              <a:latin typeface="LM Roman 12" panose="00000500000000000000" pitchFamily="50" charset="0"/>
+            </a:endParaRPr>
           </a:p>
         </p:txBody>
       </p:sp>
@@ -5641,6 +5689,80 @@
           </a:fontRef>
         </p:style>
       </p:cxnSp>
+      <p:sp>
+        <p:nvSpPr>
+          <p:cNvPr id="137" name="TextBox 136">
+            <a:extLst>
+              <a:ext uri="{FF2B5EF4-FFF2-40B4-BE49-F238E27FC236}">
+                <a16:creationId xmlns:a16="http://schemas.microsoft.com/office/drawing/2014/main" id="{C5730D1E-51DF-4233-BAED-ED63FB1AE14C}"/>
+              </a:ext>
+            </a:extLst>
+          </p:cNvPr>
+          <p:cNvSpPr txBox="1"/>
+          <p:nvPr/>
+        </p:nvSpPr>
+        <p:spPr>
+          <a:xfrm>
+            <a:off x="1473016" y="2988380"/>
+            <a:ext cx="288758" cy="461665"/>
+          </a:xfrm>
+          <a:prstGeom prst="rect">
+            <a:avLst/>
+          </a:prstGeom>
+          <a:noFill/>
+        </p:spPr>
+        <p:txBody>
+          <a:bodyPr wrap="square" rtlCol="0">
+            <a:spAutoFit/>
+          </a:bodyPr>
+          <a:lstStyle/>
+          <a:p>
+            <a:r>
+              <a:rPr lang="en-US" sz="2400" dirty="0">
+                <a:latin typeface="LM Roman 12" panose="00000500000000000000" pitchFamily="50" charset="0"/>
+              </a:rPr>
+              <a:t>1</a:t>
+            </a:r>
+          </a:p>
+        </p:txBody>
+      </p:sp>
+      <p:sp>
+        <p:nvSpPr>
+          <p:cNvPr id="138" name="TextBox 137">
+            <a:extLst>
+              <a:ext uri="{FF2B5EF4-FFF2-40B4-BE49-F238E27FC236}">
+                <a16:creationId xmlns:a16="http://schemas.microsoft.com/office/drawing/2014/main" id="{4448CF12-2E9A-4CD3-BC66-3A77D476F313}"/>
+              </a:ext>
+            </a:extLst>
+          </p:cNvPr>
+          <p:cNvSpPr txBox="1"/>
+          <p:nvPr/>
+        </p:nvSpPr>
+        <p:spPr>
+          <a:xfrm>
+            <a:off x="2564311" y="3948826"/>
+            <a:ext cx="288758" cy="461665"/>
+          </a:xfrm>
+          <a:prstGeom prst="rect">
+            <a:avLst/>
+          </a:prstGeom>
+          <a:noFill/>
+        </p:spPr>
+        <p:txBody>
+          <a:bodyPr wrap="square" rtlCol="0">
+            <a:spAutoFit/>
+          </a:bodyPr>
+          <a:lstStyle/>
+          <a:p>
+            <a:r>
+              <a:rPr lang="en-US" sz="2400" dirty="0">
+                <a:latin typeface="LM Roman 12" panose="00000500000000000000" pitchFamily="50" charset="0"/>
+              </a:rPr>
+              <a:t>1</a:t>
+            </a:r>
+          </a:p>
+        </p:txBody>
+      </p:sp>
     </p:spTree>
     <p:extLst>
       <p:ext uri="{BB962C8B-B14F-4D97-AF65-F5344CB8AC3E}">
@@ -5713,7 +5835,9 @@
           <a:lstStyle/>
           <a:p>
             <a:pPr algn="ctr"/>
-            <a:endParaRPr lang="en-US"/>
+            <a:endParaRPr lang="en-US">
+              <a:latin typeface="LM Roman 12" panose="00000500000000000000" pitchFamily="50" charset="0"/>
+            </a:endParaRPr>
           </a:p>
         </p:txBody>
       </p:sp>
@@ -5762,7 +5886,9 @@
           <a:lstStyle/>
           <a:p>
             <a:pPr algn="ctr"/>
-            <a:endParaRPr lang="en-US"/>
+            <a:endParaRPr lang="en-US">
+              <a:latin typeface="LM Roman 12" panose="00000500000000000000" pitchFamily="50" charset="0"/>
+            </a:endParaRPr>
           </a:p>
         </p:txBody>
       </p:sp>
@@ -5811,7 +5937,9 @@
           <a:lstStyle/>
           <a:p>
             <a:pPr algn="ctr"/>
-            <a:endParaRPr lang="en-US" dirty="0"/>
+            <a:endParaRPr lang="en-US" dirty="0">
+              <a:latin typeface="LM Roman 12" panose="00000500000000000000" pitchFamily="50" charset="0"/>
+            </a:endParaRPr>
           </a:p>
         </p:txBody>
       </p:sp>
@@ -5860,7 +5988,9 @@
           <a:lstStyle/>
           <a:p>
             <a:pPr algn="ctr"/>
-            <a:endParaRPr lang="en-US"/>
+            <a:endParaRPr lang="en-US">
+              <a:latin typeface="LM Roman 12" panose="00000500000000000000" pitchFamily="50" charset="0"/>
+            </a:endParaRPr>
           </a:p>
         </p:txBody>
       </p:sp>
@@ -5909,7 +6039,9 @@
           <a:lstStyle/>
           <a:p>
             <a:pPr algn="ctr"/>
-            <a:endParaRPr lang="en-US"/>
+            <a:endParaRPr lang="en-US">
+              <a:latin typeface="LM Roman 12" panose="00000500000000000000" pitchFamily="50" charset="0"/>
+            </a:endParaRPr>
           </a:p>
         </p:txBody>
       </p:sp>
@@ -5942,7 +6074,9 @@
           <a:lstStyle/>
           <a:p>
             <a:r>
-              <a:rPr lang="en-US" dirty="0"/>
+              <a:rPr lang="en-US" dirty="0">
+                <a:latin typeface="LM Roman 12" panose="00000500000000000000" pitchFamily="50" charset="0"/>
+              </a:rPr>
               <a:t>1</a:t>
             </a:r>
           </a:p>
@@ -5977,7 +6111,9 @@
           <a:lstStyle/>
           <a:p>
             <a:r>
-              <a:rPr lang="en-US" dirty="0"/>
+              <a:rPr lang="en-US" dirty="0">
+                <a:latin typeface="LM Roman 12" panose="00000500000000000000" pitchFamily="50" charset="0"/>
+              </a:rPr>
               <a:t>2</a:t>
             </a:r>
           </a:p>
@@ -6012,7 +6148,9 @@
           <a:lstStyle/>
           <a:p>
             <a:r>
-              <a:rPr lang="en-US" dirty="0"/>
+              <a:rPr lang="en-US" dirty="0">
+                <a:latin typeface="LM Roman 12" panose="00000500000000000000" pitchFamily="50" charset="0"/>
+              </a:rPr>
               <a:t>3</a:t>
             </a:r>
           </a:p>
@@ -6047,7 +6185,9 @@
           <a:lstStyle/>
           <a:p>
             <a:r>
-              <a:rPr lang="en-US" dirty="0"/>
+              <a:rPr lang="en-US" dirty="0">
+                <a:latin typeface="LM Roman 12" panose="00000500000000000000" pitchFamily="50" charset="0"/>
+              </a:rPr>
               <a:t>4</a:t>
             </a:r>
           </a:p>
@@ -6256,7 +6396,9 @@
           <a:lstStyle/>
           <a:p>
             <a:r>
-              <a:rPr lang="en-US" dirty="0"/>
+              <a:rPr lang="en-US" dirty="0">
+                <a:latin typeface="LM Roman 12" panose="00000500000000000000" pitchFamily="50" charset="0"/>
+              </a:rPr>
               <a:t>0.0</a:t>
             </a:r>
           </a:p>
@@ -6291,7 +6433,9 @@
           <a:lstStyle/>
           <a:p>
             <a:r>
-              <a:rPr lang="en-US" dirty="0"/>
+              <a:rPr lang="en-US" dirty="0">
+                <a:latin typeface="LM Roman 12" panose="00000500000000000000" pitchFamily="50" charset="0"/>
+              </a:rPr>
               <a:t>0.04</a:t>
             </a:r>
           </a:p>
@@ -6326,7 +6470,9 @@
           <a:lstStyle/>
           <a:p>
             <a:r>
-              <a:rPr lang="en-US" dirty="0"/>
+              <a:rPr lang="en-US" dirty="0">
+                <a:latin typeface="LM Roman 12" panose="00000500000000000000" pitchFamily="50" charset="0"/>
+              </a:rPr>
               <a:t>0.53</a:t>
             </a:r>
           </a:p>
@@ -6361,7 +6507,9 @@
           <a:lstStyle/>
           <a:p>
             <a:r>
-              <a:rPr lang="en-US" dirty="0"/>
+              <a:rPr lang="en-US" dirty="0">
+                <a:latin typeface="LM Roman 12" panose="00000500000000000000" pitchFamily="50" charset="0"/>
+              </a:rPr>
               <a:t>0.83</a:t>
             </a:r>
           </a:p>

</xml_diff>

<commit_message>
Finish the first state of interactive demo
</commit_message>
<xml_diff>
--- a/miscellanous/Presentation1.pptx
+++ b/miscellanous/Presentation1.pptx
@@ -11,6 +11,8 @@
     <p:sldId id="259" r:id="rId5"/>
     <p:sldId id="260" r:id="rId6"/>
     <p:sldId id="261" r:id="rId7"/>
+    <p:sldId id="262" r:id="rId8"/>
+    <p:sldId id="263" r:id="rId9"/>
   </p:sldIdLst>
   <p:sldSz cx="12192000" cy="6858000"/>
   <p:notesSz cx="6858000" cy="9144000"/>
@@ -264,7 +266,7 @@
           <a:p>
             <a:fld id="{0B9FB5A3-E293-4A93-A517-004E35C7CEF9}" type="datetimeFigureOut">
               <a:rPr lang="en-US" smtClean="0"/>
-              <a:t>4/30/2018</a:t>
+              <a:t>5/4/2018</a:t>
             </a:fld>
             <a:endParaRPr lang="en-US"/>
           </a:p>
@@ -462,7 +464,7 @@
           <a:p>
             <a:fld id="{0B9FB5A3-E293-4A93-A517-004E35C7CEF9}" type="datetimeFigureOut">
               <a:rPr lang="en-US" smtClean="0"/>
-              <a:t>4/30/2018</a:t>
+              <a:t>5/4/2018</a:t>
             </a:fld>
             <a:endParaRPr lang="en-US"/>
           </a:p>
@@ -670,7 +672,7 @@
           <a:p>
             <a:fld id="{0B9FB5A3-E293-4A93-A517-004E35C7CEF9}" type="datetimeFigureOut">
               <a:rPr lang="en-US" smtClean="0"/>
-              <a:t>4/30/2018</a:t>
+              <a:t>5/4/2018</a:t>
             </a:fld>
             <a:endParaRPr lang="en-US"/>
           </a:p>
@@ -868,7 +870,7 @@
           <a:p>
             <a:fld id="{0B9FB5A3-E293-4A93-A517-004E35C7CEF9}" type="datetimeFigureOut">
               <a:rPr lang="en-US" smtClean="0"/>
-              <a:t>4/30/2018</a:t>
+              <a:t>5/4/2018</a:t>
             </a:fld>
             <a:endParaRPr lang="en-US"/>
           </a:p>
@@ -1143,7 +1145,7 @@
           <a:p>
             <a:fld id="{0B9FB5A3-E293-4A93-A517-004E35C7CEF9}" type="datetimeFigureOut">
               <a:rPr lang="en-US" smtClean="0"/>
-              <a:t>4/30/2018</a:t>
+              <a:t>5/4/2018</a:t>
             </a:fld>
             <a:endParaRPr lang="en-US"/>
           </a:p>
@@ -1408,7 +1410,7 @@
           <a:p>
             <a:fld id="{0B9FB5A3-E293-4A93-A517-004E35C7CEF9}" type="datetimeFigureOut">
               <a:rPr lang="en-US" smtClean="0"/>
-              <a:t>4/30/2018</a:t>
+              <a:t>5/4/2018</a:t>
             </a:fld>
             <a:endParaRPr lang="en-US"/>
           </a:p>
@@ -1820,7 +1822,7 @@
           <a:p>
             <a:fld id="{0B9FB5A3-E293-4A93-A517-004E35C7CEF9}" type="datetimeFigureOut">
               <a:rPr lang="en-US" smtClean="0"/>
-              <a:t>4/30/2018</a:t>
+              <a:t>5/4/2018</a:t>
             </a:fld>
             <a:endParaRPr lang="en-US"/>
           </a:p>
@@ -1961,7 +1963,7 @@
           <a:p>
             <a:fld id="{0B9FB5A3-E293-4A93-A517-004E35C7CEF9}" type="datetimeFigureOut">
               <a:rPr lang="en-US" smtClean="0"/>
-              <a:t>4/30/2018</a:t>
+              <a:t>5/4/2018</a:t>
             </a:fld>
             <a:endParaRPr lang="en-US"/>
           </a:p>
@@ -2074,7 +2076,7 @@
           <a:p>
             <a:fld id="{0B9FB5A3-E293-4A93-A517-004E35C7CEF9}" type="datetimeFigureOut">
               <a:rPr lang="en-US" smtClean="0"/>
-              <a:t>4/30/2018</a:t>
+              <a:t>5/4/2018</a:t>
             </a:fld>
             <a:endParaRPr lang="en-US"/>
           </a:p>
@@ -2385,7 +2387,7 @@
           <a:p>
             <a:fld id="{0B9FB5A3-E293-4A93-A517-004E35C7CEF9}" type="datetimeFigureOut">
               <a:rPr lang="en-US" smtClean="0"/>
-              <a:t>4/30/2018</a:t>
+              <a:t>5/4/2018</a:t>
             </a:fld>
             <a:endParaRPr lang="en-US"/>
           </a:p>
@@ -2673,7 +2675,7 @@
           <a:p>
             <a:fld id="{0B9FB5A3-E293-4A93-A517-004E35C7CEF9}" type="datetimeFigureOut">
               <a:rPr lang="en-US" smtClean="0"/>
-              <a:t>4/30/2018</a:t>
+              <a:t>5/4/2018</a:t>
             </a:fld>
             <a:endParaRPr lang="en-US"/>
           </a:p>
@@ -2914,7 +2916,7 @@
           <a:p>
             <a:fld id="{0B9FB5A3-E293-4A93-A517-004E35C7CEF9}" type="datetimeFigureOut">
               <a:rPr lang="en-US" smtClean="0"/>
-              <a:t>4/30/2018</a:t>
+              <a:t>5/4/2018</a:t>
             </a:fld>
             <a:endParaRPr lang="en-US"/>
           </a:p>
@@ -6842,6 +6844,426 @@
 </p:sld>
 </file>
 
+<file path=ppt/slides/slide7.xml><?xml version="1.0" encoding="utf-8"?>
+<p:sld xmlns:a="http://schemas.openxmlformats.org/drawingml/2006/main" xmlns:r="http://schemas.openxmlformats.org/officeDocument/2006/relationships" xmlns:p="http://schemas.openxmlformats.org/presentationml/2006/main">
+  <p:cSld>
+    <p:spTree>
+      <p:nvGrpSpPr>
+        <p:cNvPr id="1" name=""/>
+        <p:cNvGrpSpPr/>
+        <p:nvPr/>
+      </p:nvGrpSpPr>
+      <p:grpSpPr>
+        <a:xfrm>
+          <a:off x="0" y="0"/>
+          <a:ext cx="0" cy="0"/>
+          <a:chOff x="0" y="0"/>
+          <a:chExt cx="0" cy="0"/>
+        </a:xfrm>
+      </p:grpSpPr>
+      <p:pic>
+        <p:nvPicPr>
+          <p:cNvPr id="5" name="Picture 4">
+            <a:extLst>
+              <a:ext uri="{FF2B5EF4-FFF2-40B4-BE49-F238E27FC236}">
+                <a16:creationId xmlns:a16="http://schemas.microsoft.com/office/drawing/2014/main" id="{4D4741BF-F7E9-4B93-8024-75B01DC1A19B}"/>
+              </a:ext>
+            </a:extLst>
+          </p:cNvPr>
+          <p:cNvPicPr>
+            <a:picLocks noChangeAspect="1"/>
+          </p:cNvPicPr>
+          <p:nvPr/>
+        </p:nvPicPr>
+        <p:blipFill>
+          <a:blip r:embed="rId2">
+            <a:extLst>
+              <a:ext uri="{28A0092B-C50C-407E-A947-70E740481C1C}">
+                <a14:useLocalDpi xmlns:a14="http://schemas.microsoft.com/office/drawing/2010/main" val="0"/>
+              </a:ext>
+            </a:extLst>
+          </a:blip>
+          <a:stretch>
+            <a:fillRect/>
+          </a:stretch>
+        </p:blipFill>
+        <p:spPr>
+          <a:xfrm>
+            <a:off x="288672" y="86650"/>
+            <a:ext cx="3359146" cy="3342350"/>
+          </a:xfrm>
+          <a:prstGeom prst="rect">
+            <a:avLst/>
+          </a:prstGeom>
+        </p:spPr>
+      </p:pic>
+      <p:pic>
+        <p:nvPicPr>
+          <p:cNvPr id="7" name="Picture 6">
+            <a:extLst>
+              <a:ext uri="{FF2B5EF4-FFF2-40B4-BE49-F238E27FC236}">
+                <a16:creationId xmlns:a16="http://schemas.microsoft.com/office/drawing/2014/main" id="{111C3250-33F1-4594-98C1-85FAAEFF7E8B}"/>
+              </a:ext>
+            </a:extLst>
+          </p:cNvPr>
+          <p:cNvPicPr>
+            <a:picLocks noChangeAspect="1"/>
+          </p:cNvPicPr>
+          <p:nvPr/>
+        </p:nvPicPr>
+        <p:blipFill>
+          <a:blip r:embed="rId3">
+            <a:extLst>
+              <a:ext uri="{28A0092B-C50C-407E-A947-70E740481C1C}">
+                <a14:useLocalDpi xmlns:a14="http://schemas.microsoft.com/office/drawing/2010/main" val="0"/>
+              </a:ext>
+            </a:extLst>
+          </a:blip>
+          <a:stretch>
+            <a:fillRect/>
+          </a:stretch>
+        </p:blipFill>
+        <p:spPr>
+          <a:xfrm>
+            <a:off x="3700291" y="86650"/>
+            <a:ext cx="3376111" cy="3342349"/>
+          </a:xfrm>
+          <a:prstGeom prst="rect">
+            <a:avLst/>
+          </a:prstGeom>
+        </p:spPr>
+      </p:pic>
+      <p:pic>
+        <p:nvPicPr>
+          <p:cNvPr id="9" name="Picture 8">
+            <a:extLst>
+              <a:ext uri="{FF2B5EF4-FFF2-40B4-BE49-F238E27FC236}">
+                <a16:creationId xmlns:a16="http://schemas.microsoft.com/office/drawing/2014/main" id="{0E7DC602-34E3-4CCC-8737-DC8440B2CA23}"/>
+              </a:ext>
+            </a:extLst>
+          </p:cNvPr>
+          <p:cNvPicPr>
+            <a:picLocks noChangeAspect="1"/>
+          </p:cNvPicPr>
+          <p:nvPr/>
+        </p:nvPicPr>
+        <p:blipFill>
+          <a:blip r:embed="rId4">
+            <a:extLst>
+              <a:ext uri="{28A0092B-C50C-407E-A947-70E740481C1C}">
+                <a14:useLocalDpi xmlns:a14="http://schemas.microsoft.com/office/drawing/2010/main" val="0"/>
+              </a:ext>
+            </a:extLst>
+          </a:blip>
+          <a:stretch>
+            <a:fillRect/>
+          </a:stretch>
+        </p:blipFill>
+        <p:spPr>
+          <a:xfrm>
+            <a:off x="7128875" y="86650"/>
+            <a:ext cx="3393249" cy="3342350"/>
+          </a:xfrm>
+          <a:prstGeom prst="rect">
+            <a:avLst/>
+          </a:prstGeom>
+        </p:spPr>
+      </p:pic>
+      <p:pic>
+        <p:nvPicPr>
+          <p:cNvPr id="11" name="Picture 10">
+            <a:extLst>
+              <a:ext uri="{FF2B5EF4-FFF2-40B4-BE49-F238E27FC236}">
+                <a16:creationId xmlns:a16="http://schemas.microsoft.com/office/drawing/2014/main" id="{47D643BE-3681-40C2-9684-B30A0BDE3CAA}"/>
+              </a:ext>
+            </a:extLst>
+          </p:cNvPr>
+          <p:cNvPicPr>
+            <a:picLocks noChangeAspect="1"/>
+          </p:cNvPicPr>
+          <p:nvPr/>
+        </p:nvPicPr>
+        <p:blipFill>
+          <a:blip r:embed="rId5">
+            <a:extLst>
+              <a:ext uri="{28A0092B-C50C-407E-A947-70E740481C1C}">
+                <a14:useLocalDpi xmlns:a14="http://schemas.microsoft.com/office/drawing/2010/main" val="0"/>
+              </a:ext>
+            </a:extLst>
+          </a:blip>
+          <a:stretch>
+            <a:fillRect/>
+          </a:stretch>
+        </p:blipFill>
+        <p:spPr>
+          <a:xfrm>
+            <a:off x="237257" y="3317033"/>
+            <a:ext cx="3410561" cy="3342349"/>
+          </a:xfrm>
+          <a:prstGeom prst="rect">
+            <a:avLst/>
+          </a:prstGeom>
+        </p:spPr>
+      </p:pic>
+      <p:pic>
+        <p:nvPicPr>
+          <p:cNvPr id="13" name="Picture 12">
+            <a:extLst>
+              <a:ext uri="{FF2B5EF4-FFF2-40B4-BE49-F238E27FC236}">
+                <a16:creationId xmlns:a16="http://schemas.microsoft.com/office/drawing/2014/main" id="{75B66D9C-FB43-4EF5-8563-574B97475B4D}"/>
+              </a:ext>
+            </a:extLst>
+          </p:cNvPr>
+          <p:cNvPicPr>
+            <a:picLocks noChangeAspect="1"/>
+          </p:cNvPicPr>
+          <p:nvPr/>
+        </p:nvPicPr>
+        <p:blipFill>
+          <a:blip r:embed="rId6">
+            <a:extLst>
+              <a:ext uri="{28A0092B-C50C-407E-A947-70E740481C1C}">
+                <a14:useLocalDpi xmlns:a14="http://schemas.microsoft.com/office/drawing/2010/main" val="0"/>
+              </a:ext>
+            </a:extLst>
+          </a:blip>
+          <a:stretch>
+            <a:fillRect/>
+          </a:stretch>
+        </p:blipFill>
+        <p:spPr>
+          <a:xfrm>
+            <a:off x="3648782" y="3317033"/>
+            <a:ext cx="3428052" cy="3342350"/>
+          </a:xfrm>
+          <a:prstGeom prst="rect">
+            <a:avLst/>
+          </a:prstGeom>
+        </p:spPr>
+      </p:pic>
+      <p:pic>
+        <p:nvPicPr>
+          <p:cNvPr id="15" name="Picture 14">
+            <a:extLst>
+              <a:ext uri="{FF2B5EF4-FFF2-40B4-BE49-F238E27FC236}">
+                <a16:creationId xmlns:a16="http://schemas.microsoft.com/office/drawing/2014/main" id="{0B67678A-8006-4BC5-88B1-6EF396E0CDD9}"/>
+              </a:ext>
+            </a:extLst>
+          </p:cNvPr>
+          <p:cNvPicPr>
+            <a:picLocks noChangeAspect="1"/>
+          </p:cNvPicPr>
+          <p:nvPr/>
+        </p:nvPicPr>
+        <p:blipFill>
+          <a:blip r:embed="rId7">
+            <a:extLst>
+              <a:ext uri="{28A0092B-C50C-407E-A947-70E740481C1C}">
+                <a14:useLocalDpi xmlns:a14="http://schemas.microsoft.com/office/drawing/2010/main" val="0"/>
+              </a:ext>
+            </a:extLst>
+          </a:blip>
+          <a:stretch>
+            <a:fillRect/>
+          </a:stretch>
+        </p:blipFill>
+        <p:spPr>
+          <a:xfrm>
+            <a:off x="7076402" y="3317033"/>
+            <a:ext cx="3445722" cy="3342350"/>
+          </a:xfrm>
+          <a:prstGeom prst="rect">
+            <a:avLst/>
+          </a:prstGeom>
+        </p:spPr>
+      </p:pic>
+    </p:spTree>
+    <p:extLst>
+      <p:ext uri="{BB962C8B-B14F-4D97-AF65-F5344CB8AC3E}">
+        <p14:creationId xmlns:p14="http://schemas.microsoft.com/office/powerpoint/2010/main" val="3266264313"/>
+      </p:ext>
+    </p:extLst>
+  </p:cSld>
+  <p:clrMapOvr>
+    <a:masterClrMapping/>
+  </p:clrMapOvr>
+</p:sld>
+</file>
+
+<file path=ppt/slides/slide8.xml><?xml version="1.0" encoding="utf-8"?>
+<p:sld xmlns:a="http://schemas.openxmlformats.org/drawingml/2006/main" xmlns:r="http://schemas.openxmlformats.org/officeDocument/2006/relationships" xmlns:p="http://schemas.openxmlformats.org/presentationml/2006/main">
+  <p:cSld>
+    <p:spTree>
+      <p:nvGrpSpPr>
+        <p:cNvPr id="1" name=""/>
+        <p:cNvGrpSpPr/>
+        <p:nvPr/>
+      </p:nvGrpSpPr>
+      <p:grpSpPr>
+        <a:xfrm>
+          <a:off x="0" y="0"/>
+          <a:ext cx="0" cy="0"/>
+          <a:chOff x="0" y="0"/>
+          <a:chExt cx="0" cy="0"/>
+        </a:xfrm>
+      </p:grpSpPr>
+      <p:pic>
+        <p:nvPicPr>
+          <p:cNvPr id="5" name="Picture 4">
+            <a:extLst>
+              <a:ext uri="{FF2B5EF4-FFF2-40B4-BE49-F238E27FC236}">
+                <a16:creationId xmlns:a16="http://schemas.microsoft.com/office/drawing/2014/main" id="{CE079A98-57A1-40AF-A595-F3A934BE14E3}"/>
+              </a:ext>
+            </a:extLst>
+          </p:cNvPr>
+          <p:cNvPicPr>
+            <a:picLocks noChangeAspect="1"/>
+          </p:cNvPicPr>
+          <p:nvPr/>
+        </p:nvPicPr>
+        <p:blipFill>
+          <a:blip r:embed="rId2">
+            <a:extLst>
+              <a:ext uri="{28A0092B-C50C-407E-A947-70E740481C1C}">
+                <a14:useLocalDpi xmlns:a14="http://schemas.microsoft.com/office/drawing/2010/main" val="0"/>
+              </a:ext>
+            </a:extLst>
+          </a:blip>
+          <a:stretch>
+            <a:fillRect/>
+          </a:stretch>
+        </p:blipFill>
+        <p:spPr>
+          <a:xfrm>
+            <a:off x="0" y="0"/>
+            <a:ext cx="2972666" cy="2957802"/>
+          </a:xfrm>
+          <a:prstGeom prst="rect">
+            <a:avLst/>
+          </a:prstGeom>
+        </p:spPr>
+      </p:pic>
+      <p:pic>
+        <p:nvPicPr>
+          <p:cNvPr id="7" name="Picture 6">
+            <a:extLst>
+              <a:ext uri="{FF2B5EF4-FFF2-40B4-BE49-F238E27FC236}">
+                <a16:creationId xmlns:a16="http://schemas.microsoft.com/office/drawing/2014/main" id="{61EEA6A8-3756-4F64-8211-7E22927B3997}"/>
+              </a:ext>
+            </a:extLst>
+          </p:cNvPr>
+          <p:cNvPicPr>
+            <a:picLocks noChangeAspect="1"/>
+          </p:cNvPicPr>
+          <p:nvPr/>
+        </p:nvPicPr>
+        <p:blipFill>
+          <a:blip r:embed="rId3">
+            <a:extLst>
+              <a:ext uri="{28A0092B-C50C-407E-A947-70E740481C1C}">
+                <a14:useLocalDpi xmlns:a14="http://schemas.microsoft.com/office/drawing/2010/main" val="0"/>
+              </a:ext>
+            </a:extLst>
+          </a:blip>
+          <a:stretch>
+            <a:fillRect/>
+          </a:stretch>
+        </p:blipFill>
+        <p:spPr>
+          <a:xfrm>
+            <a:off x="2694554" y="-1"/>
+            <a:ext cx="2987681" cy="2957803"/>
+          </a:xfrm>
+          <a:prstGeom prst="rect">
+            <a:avLst/>
+          </a:prstGeom>
+        </p:spPr>
+      </p:pic>
+      <p:pic>
+        <p:nvPicPr>
+          <p:cNvPr id="9" name="Picture 8">
+            <a:extLst>
+              <a:ext uri="{FF2B5EF4-FFF2-40B4-BE49-F238E27FC236}">
+                <a16:creationId xmlns:a16="http://schemas.microsoft.com/office/drawing/2014/main" id="{CB40C456-CB39-4A12-A716-0E924B95F4A2}"/>
+              </a:ext>
+            </a:extLst>
+          </p:cNvPr>
+          <p:cNvPicPr>
+            <a:picLocks noChangeAspect="1"/>
+          </p:cNvPicPr>
+          <p:nvPr/>
+        </p:nvPicPr>
+        <p:blipFill>
+          <a:blip r:embed="rId4">
+            <a:extLst>
+              <a:ext uri="{28A0092B-C50C-407E-A947-70E740481C1C}">
+                <a14:useLocalDpi xmlns:a14="http://schemas.microsoft.com/office/drawing/2010/main" val="0"/>
+              </a:ext>
+            </a:extLst>
+          </a:blip>
+          <a:stretch>
+            <a:fillRect/>
+          </a:stretch>
+        </p:blipFill>
+        <p:spPr>
+          <a:xfrm>
+            <a:off x="5443128" y="0"/>
+            <a:ext cx="3002846" cy="2957802"/>
+          </a:xfrm>
+          <a:prstGeom prst="rect">
+            <a:avLst/>
+          </a:prstGeom>
+        </p:spPr>
+      </p:pic>
+      <p:pic>
+        <p:nvPicPr>
+          <p:cNvPr id="11" name="Picture 10">
+            <a:extLst>
+              <a:ext uri="{FF2B5EF4-FFF2-40B4-BE49-F238E27FC236}">
+                <a16:creationId xmlns:a16="http://schemas.microsoft.com/office/drawing/2014/main" id="{C9404C59-D74B-4FD0-8204-880B449DEA76}"/>
+              </a:ext>
+            </a:extLst>
+          </p:cNvPr>
+          <p:cNvPicPr>
+            <a:picLocks noChangeAspect="1"/>
+          </p:cNvPicPr>
+          <p:nvPr/>
+        </p:nvPicPr>
+        <p:blipFill>
+          <a:blip r:embed="rId5">
+            <a:extLst>
+              <a:ext uri="{28A0092B-C50C-407E-A947-70E740481C1C}">
+                <a14:useLocalDpi xmlns:a14="http://schemas.microsoft.com/office/drawing/2010/main" val="0"/>
+              </a:ext>
+            </a:extLst>
+          </a:blip>
+          <a:stretch>
+            <a:fillRect/>
+          </a:stretch>
+        </p:blipFill>
+        <p:spPr>
+          <a:xfrm>
+            <a:off x="8152697" y="0"/>
+            <a:ext cx="3018167" cy="2957803"/>
+          </a:xfrm>
+          <a:prstGeom prst="rect">
+            <a:avLst/>
+          </a:prstGeom>
+        </p:spPr>
+      </p:pic>
+    </p:spTree>
+    <p:extLst>
+      <p:ext uri="{BB962C8B-B14F-4D97-AF65-F5344CB8AC3E}">
+        <p14:creationId xmlns:p14="http://schemas.microsoft.com/office/powerpoint/2010/main" val="3855113958"/>
+      </p:ext>
+    </p:extLst>
+  </p:cSld>
+  <p:clrMapOvr>
+    <a:masterClrMapping/>
+  </p:clrMapOvr>
+</p:sld>
+</file>
+
 <file path=ppt/theme/theme1.xml><?xml version="1.0" encoding="utf-8"?>
 <a:theme xmlns:a="http://schemas.openxmlformats.org/drawingml/2006/main" name="Office Theme">
   <a:themeElements>

</xml_diff>

<commit_message>
Fix move next in action learner interactive
</commit_message>
<xml_diff>
--- a/miscellanous/Presentation1.pptx
+++ b/miscellanous/Presentation1.pptx
@@ -13,6 +13,7 @@
     <p:sldId id="261" r:id="rId7"/>
     <p:sldId id="262" r:id="rId8"/>
     <p:sldId id="263" r:id="rId9"/>
+    <p:sldId id="264" r:id="rId10"/>
   </p:sldIdLst>
   <p:sldSz cx="12192000" cy="6858000"/>
   <p:notesSz cx="6858000" cy="9144000"/>
@@ -7264,6 +7265,324 @@
 </p:sld>
 </file>
 
+<file path=ppt/slides/slide9.xml><?xml version="1.0" encoding="utf-8"?>
+<p:sld xmlns:a="http://schemas.openxmlformats.org/drawingml/2006/main" xmlns:r="http://schemas.openxmlformats.org/officeDocument/2006/relationships" xmlns:p="http://schemas.openxmlformats.org/presentationml/2006/main">
+  <p:cSld>
+    <p:spTree>
+      <p:nvGrpSpPr>
+        <p:cNvPr id="1" name=""/>
+        <p:cNvGrpSpPr/>
+        <p:nvPr/>
+      </p:nvGrpSpPr>
+      <p:grpSpPr>
+        <a:xfrm>
+          <a:off x="0" y="0"/>
+          <a:ext cx="0" cy="0"/>
+          <a:chOff x="0" y="0"/>
+          <a:chExt cx="0" cy="0"/>
+        </a:xfrm>
+      </p:grpSpPr>
+      <p:pic>
+        <p:nvPicPr>
+          <p:cNvPr id="5" name="Picture 4">
+            <a:extLst>
+              <a:ext uri="{FF2B5EF4-FFF2-40B4-BE49-F238E27FC236}">
+                <a16:creationId xmlns:a16="http://schemas.microsoft.com/office/drawing/2014/main" id="{4043C5BA-7ACF-4BB0-B223-554D26436506}"/>
+              </a:ext>
+            </a:extLst>
+          </p:cNvPr>
+          <p:cNvPicPr>
+            <a:picLocks noChangeAspect="1"/>
+          </p:cNvPicPr>
+          <p:nvPr/>
+        </p:nvPicPr>
+        <p:blipFill>
+          <a:blip r:embed="rId2">
+            <a:extLst>
+              <a:ext uri="{28A0092B-C50C-407E-A947-70E740481C1C}">
+                <a14:useLocalDpi xmlns:a14="http://schemas.microsoft.com/office/drawing/2010/main" val="0"/>
+              </a:ext>
+            </a:extLst>
+          </a:blip>
+          <a:stretch>
+            <a:fillRect/>
+          </a:stretch>
+        </p:blipFill>
+        <p:spPr>
+          <a:xfrm>
+            <a:off x="714150" y="-9"/>
+            <a:ext cx="3020454" cy="2990249"/>
+          </a:xfrm>
+          <a:prstGeom prst="rect">
+            <a:avLst/>
+          </a:prstGeom>
+        </p:spPr>
+      </p:pic>
+      <p:pic>
+        <p:nvPicPr>
+          <p:cNvPr id="7" name="Picture 6">
+            <a:extLst>
+              <a:ext uri="{FF2B5EF4-FFF2-40B4-BE49-F238E27FC236}">
+                <a16:creationId xmlns:a16="http://schemas.microsoft.com/office/drawing/2014/main" id="{C9B49D93-A604-4FC9-9CC6-E1CCA5B61FA4}"/>
+              </a:ext>
+            </a:extLst>
+          </p:cNvPr>
+          <p:cNvPicPr>
+            <a:picLocks noChangeAspect="1"/>
+          </p:cNvPicPr>
+          <p:nvPr/>
+        </p:nvPicPr>
+        <p:blipFill>
+          <a:blip r:embed="rId3">
+            <a:extLst>
+              <a:ext uri="{28A0092B-C50C-407E-A947-70E740481C1C}">
+                <a14:useLocalDpi xmlns:a14="http://schemas.microsoft.com/office/drawing/2010/main" val="0"/>
+              </a:ext>
+            </a:extLst>
+          </a:blip>
+          <a:stretch>
+            <a:fillRect/>
+          </a:stretch>
+        </p:blipFill>
+        <p:spPr>
+          <a:xfrm>
+            <a:off x="3502355" y="-6"/>
+            <a:ext cx="3035786" cy="2990249"/>
+          </a:xfrm>
+          <a:prstGeom prst="rect">
+            <a:avLst/>
+          </a:prstGeom>
+        </p:spPr>
+      </p:pic>
+      <p:pic>
+        <p:nvPicPr>
+          <p:cNvPr id="9" name="Picture 8">
+            <a:extLst>
+              <a:ext uri="{FF2B5EF4-FFF2-40B4-BE49-F238E27FC236}">
+                <a16:creationId xmlns:a16="http://schemas.microsoft.com/office/drawing/2014/main" id="{3B05F07C-32FD-4C88-8B09-F9F139390D25}"/>
+              </a:ext>
+            </a:extLst>
+          </p:cNvPr>
+          <p:cNvPicPr>
+            <a:picLocks noChangeAspect="1"/>
+          </p:cNvPicPr>
+          <p:nvPr/>
+        </p:nvPicPr>
+        <p:blipFill>
+          <a:blip r:embed="rId4">
+            <a:extLst>
+              <a:ext uri="{28A0092B-C50C-407E-A947-70E740481C1C}">
+                <a14:useLocalDpi xmlns:a14="http://schemas.microsoft.com/office/drawing/2010/main" val="0"/>
+              </a:ext>
+            </a:extLst>
+          </a:blip>
+          <a:stretch>
+            <a:fillRect/>
+          </a:stretch>
+        </p:blipFill>
+        <p:spPr>
+          <a:xfrm>
+            <a:off x="6321540" y="-3"/>
+            <a:ext cx="3051275" cy="2990249"/>
+          </a:xfrm>
+          <a:prstGeom prst="rect">
+            <a:avLst/>
+          </a:prstGeom>
+        </p:spPr>
+      </p:pic>
+      <p:pic>
+        <p:nvPicPr>
+          <p:cNvPr id="11" name="Picture 10">
+            <a:extLst>
+              <a:ext uri="{FF2B5EF4-FFF2-40B4-BE49-F238E27FC236}">
+                <a16:creationId xmlns:a16="http://schemas.microsoft.com/office/drawing/2014/main" id="{B5E299CD-6812-4752-92AC-9D130D5D9D65}"/>
+              </a:ext>
+            </a:extLst>
+          </p:cNvPr>
+          <p:cNvPicPr>
+            <a:picLocks noChangeAspect="1"/>
+          </p:cNvPicPr>
+          <p:nvPr/>
+        </p:nvPicPr>
+        <p:blipFill>
+          <a:blip r:embed="rId5">
+            <a:extLst>
+              <a:ext uri="{28A0092B-C50C-407E-A947-70E740481C1C}">
+                <a14:useLocalDpi xmlns:a14="http://schemas.microsoft.com/office/drawing/2010/main" val="0"/>
+              </a:ext>
+            </a:extLst>
+          </a:blip>
+          <a:stretch>
+            <a:fillRect/>
+          </a:stretch>
+        </p:blipFill>
+        <p:spPr>
+          <a:xfrm>
+            <a:off x="9125077" y="0"/>
+            <a:ext cx="3066923" cy="2990249"/>
+          </a:xfrm>
+          <a:prstGeom prst="rect">
+            <a:avLst/>
+          </a:prstGeom>
+        </p:spPr>
+      </p:pic>
+      <p:pic>
+        <p:nvPicPr>
+          <p:cNvPr id="13" name="Picture 12">
+            <a:extLst>
+              <a:ext uri="{FF2B5EF4-FFF2-40B4-BE49-F238E27FC236}">
+                <a16:creationId xmlns:a16="http://schemas.microsoft.com/office/drawing/2014/main" id="{E47A1EF7-3E76-43AB-91AC-29F80907280B}"/>
+              </a:ext>
+            </a:extLst>
+          </p:cNvPr>
+          <p:cNvPicPr>
+            <a:picLocks noChangeAspect="1"/>
+          </p:cNvPicPr>
+          <p:nvPr/>
+        </p:nvPicPr>
+        <p:blipFill>
+          <a:blip r:embed="rId6">
+            <a:extLst>
+              <a:ext uri="{28A0092B-C50C-407E-A947-70E740481C1C}">
+                <a14:useLocalDpi xmlns:a14="http://schemas.microsoft.com/office/drawing/2010/main" val="0"/>
+              </a:ext>
+            </a:extLst>
+          </a:blip>
+          <a:stretch>
+            <a:fillRect/>
+          </a:stretch>
+        </p:blipFill>
+        <p:spPr>
+          <a:xfrm>
+            <a:off x="714313" y="3867592"/>
+            <a:ext cx="3020291" cy="2990088"/>
+          </a:xfrm>
+          <a:prstGeom prst="rect">
+            <a:avLst/>
+          </a:prstGeom>
+        </p:spPr>
+      </p:pic>
+      <p:pic>
+        <p:nvPicPr>
+          <p:cNvPr id="15" name="Picture 14">
+            <a:extLst>
+              <a:ext uri="{FF2B5EF4-FFF2-40B4-BE49-F238E27FC236}">
+                <a16:creationId xmlns:a16="http://schemas.microsoft.com/office/drawing/2014/main" id="{A53D518A-82A2-4CB0-8F0E-80B49E567DF3}"/>
+              </a:ext>
+            </a:extLst>
+          </p:cNvPr>
+          <p:cNvPicPr>
+            <a:picLocks noChangeAspect="1"/>
+          </p:cNvPicPr>
+          <p:nvPr/>
+        </p:nvPicPr>
+        <p:blipFill>
+          <a:blip r:embed="rId7">
+            <a:extLst>
+              <a:ext uri="{28A0092B-C50C-407E-A947-70E740481C1C}">
+                <a14:useLocalDpi xmlns:a14="http://schemas.microsoft.com/office/drawing/2010/main" val="0"/>
+              </a:ext>
+            </a:extLst>
+          </a:blip>
+          <a:stretch>
+            <a:fillRect/>
+          </a:stretch>
+        </p:blipFill>
+        <p:spPr>
+          <a:xfrm>
+            <a:off x="3502519" y="3867752"/>
+            <a:ext cx="3035622" cy="2990088"/>
+          </a:xfrm>
+          <a:prstGeom prst="rect">
+            <a:avLst/>
+          </a:prstGeom>
+        </p:spPr>
+      </p:pic>
+      <p:pic>
+        <p:nvPicPr>
+          <p:cNvPr id="17" name="Picture 16">
+            <a:extLst>
+              <a:ext uri="{FF2B5EF4-FFF2-40B4-BE49-F238E27FC236}">
+                <a16:creationId xmlns:a16="http://schemas.microsoft.com/office/drawing/2014/main" id="{1A0D89B2-EF9E-47D5-8DBD-BA4BFF19D27B}"/>
+              </a:ext>
+            </a:extLst>
+          </p:cNvPr>
+          <p:cNvPicPr>
+            <a:picLocks noChangeAspect="1"/>
+          </p:cNvPicPr>
+          <p:nvPr/>
+        </p:nvPicPr>
+        <p:blipFill>
+          <a:blip r:embed="rId8">
+            <a:extLst>
+              <a:ext uri="{28A0092B-C50C-407E-A947-70E740481C1C}">
+                <a14:useLocalDpi xmlns:a14="http://schemas.microsoft.com/office/drawing/2010/main" val="0"/>
+              </a:ext>
+            </a:extLst>
+          </a:blip>
+          <a:stretch>
+            <a:fillRect/>
+          </a:stretch>
+        </p:blipFill>
+        <p:spPr>
+          <a:xfrm>
+            <a:off x="6321704" y="3867912"/>
+            <a:ext cx="3051111" cy="2990088"/>
+          </a:xfrm>
+          <a:prstGeom prst="rect">
+            <a:avLst/>
+          </a:prstGeom>
+        </p:spPr>
+      </p:pic>
+      <p:pic>
+        <p:nvPicPr>
+          <p:cNvPr id="19" name="Picture 18">
+            <a:extLst>
+              <a:ext uri="{FF2B5EF4-FFF2-40B4-BE49-F238E27FC236}">
+                <a16:creationId xmlns:a16="http://schemas.microsoft.com/office/drawing/2014/main" id="{938269D8-6169-4B02-8EAF-E9FF7D40DD48}"/>
+              </a:ext>
+            </a:extLst>
+          </p:cNvPr>
+          <p:cNvPicPr>
+            <a:picLocks noChangeAspect="1"/>
+          </p:cNvPicPr>
+          <p:nvPr/>
+        </p:nvPicPr>
+        <p:blipFill>
+          <a:blip r:embed="rId9">
+            <a:extLst>
+              <a:ext uri="{28A0092B-C50C-407E-A947-70E740481C1C}">
+                <a14:useLocalDpi xmlns:a14="http://schemas.microsoft.com/office/drawing/2010/main" val="0"/>
+              </a:ext>
+            </a:extLst>
+          </a:blip>
+          <a:stretch>
+            <a:fillRect/>
+          </a:stretch>
+        </p:blipFill>
+        <p:spPr>
+          <a:xfrm>
+            <a:off x="9125077" y="3867752"/>
+            <a:ext cx="3066757" cy="2990088"/>
+          </a:xfrm>
+          <a:prstGeom prst="rect">
+            <a:avLst/>
+          </a:prstGeom>
+        </p:spPr>
+      </p:pic>
+    </p:spTree>
+    <p:extLst>
+      <p:ext uri="{BB962C8B-B14F-4D97-AF65-F5344CB8AC3E}">
+        <p14:creationId xmlns:p14="http://schemas.microsoft.com/office/powerpoint/2010/main" val="48070192"/>
+      </p:ext>
+    </p:extLst>
+  </p:cSld>
+  <p:clrMapOvr>
+    <a:masterClrMapping/>
+  </p:clrMapOvr>
+</p:sld>
+</file>
+
 <file path=ppt/theme/theme1.xml><?xml version="1.0" encoding="utf-8"?>
 <a:theme xmlns:a="http://schemas.openxmlformats.org/drawingml/2006/main" name="Office Theme">
   <a:themeElements>

</xml_diff>